<commit_message>
finalized final project PowerPoint
</commit_message>
<xml_diff>
--- a/presentation.pptx
+++ b/presentation.pptx
@@ -6,7 +6,9 @@
   </p:sldMasterIdLst>
   <p:sldIdLst>
     <p:sldId id="256" r:id="rId2"/>
-    <p:sldId id="257" r:id="rId3"/>
+    <p:sldId id="258" r:id="rId3"/>
+    <p:sldId id="259" r:id="rId4"/>
+    <p:sldId id="260" r:id="rId5"/>
   </p:sldIdLst>
   <p:sldSz cx="12192000" cy="6858000"/>
   <p:notesSz cx="6858000" cy="9144000"/>
@@ -262,7 +264,7 @@
           <a:p>
             <a:fld id="{C032684F-3C3F-4551-A4FE-AAB17348CBF0}" type="datetimeFigureOut">
               <a:rPr lang="sv-SE" smtClean="0"/>
-              <a:t>2023-09-21</a:t>
+              <a:t>2023-09-22</a:t>
             </a:fld>
             <a:endParaRPr lang="sv-SE"/>
           </a:p>
@@ -462,7 +464,7 @@
           <a:p>
             <a:fld id="{C032684F-3C3F-4551-A4FE-AAB17348CBF0}" type="datetimeFigureOut">
               <a:rPr lang="sv-SE" smtClean="0"/>
-              <a:t>2023-09-21</a:t>
+              <a:t>2023-09-22</a:t>
             </a:fld>
             <a:endParaRPr lang="sv-SE"/>
           </a:p>
@@ -672,7 +674,7 @@
           <a:p>
             <a:fld id="{C032684F-3C3F-4551-A4FE-AAB17348CBF0}" type="datetimeFigureOut">
               <a:rPr lang="sv-SE" smtClean="0"/>
-              <a:t>2023-09-21</a:t>
+              <a:t>2023-09-22</a:t>
             </a:fld>
             <a:endParaRPr lang="sv-SE"/>
           </a:p>
@@ -872,7 +874,7 @@
           <a:p>
             <a:fld id="{C032684F-3C3F-4551-A4FE-AAB17348CBF0}" type="datetimeFigureOut">
               <a:rPr lang="sv-SE" smtClean="0"/>
-              <a:t>2023-09-21</a:t>
+              <a:t>2023-09-22</a:t>
             </a:fld>
             <a:endParaRPr lang="sv-SE"/>
           </a:p>
@@ -1148,7 +1150,7 @@
           <a:p>
             <a:fld id="{C032684F-3C3F-4551-A4FE-AAB17348CBF0}" type="datetimeFigureOut">
               <a:rPr lang="sv-SE" smtClean="0"/>
-              <a:t>2023-09-21</a:t>
+              <a:t>2023-09-22</a:t>
             </a:fld>
             <a:endParaRPr lang="sv-SE"/>
           </a:p>
@@ -1416,7 +1418,7 @@
           <a:p>
             <a:fld id="{C032684F-3C3F-4551-A4FE-AAB17348CBF0}" type="datetimeFigureOut">
               <a:rPr lang="sv-SE" smtClean="0"/>
-              <a:t>2023-09-21</a:t>
+              <a:t>2023-09-22</a:t>
             </a:fld>
             <a:endParaRPr lang="sv-SE"/>
           </a:p>
@@ -1831,7 +1833,7 @@
           <a:p>
             <a:fld id="{C032684F-3C3F-4551-A4FE-AAB17348CBF0}" type="datetimeFigureOut">
               <a:rPr lang="sv-SE" smtClean="0"/>
-              <a:t>2023-09-21</a:t>
+              <a:t>2023-09-22</a:t>
             </a:fld>
             <a:endParaRPr lang="sv-SE"/>
           </a:p>
@@ -1973,7 +1975,7 @@
           <a:p>
             <a:fld id="{C032684F-3C3F-4551-A4FE-AAB17348CBF0}" type="datetimeFigureOut">
               <a:rPr lang="sv-SE" smtClean="0"/>
-              <a:t>2023-09-21</a:t>
+              <a:t>2023-09-22</a:t>
             </a:fld>
             <a:endParaRPr lang="sv-SE"/>
           </a:p>
@@ -2086,7 +2088,7 @@
           <a:p>
             <a:fld id="{C032684F-3C3F-4551-A4FE-AAB17348CBF0}" type="datetimeFigureOut">
               <a:rPr lang="sv-SE" smtClean="0"/>
-              <a:t>2023-09-21</a:t>
+              <a:t>2023-09-22</a:t>
             </a:fld>
             <a:endParaRPr lang="sv-SE"/>
           </a:p>
@@ -2399,7 +2401,7 @@
           <a:p>
             <a:fld id="{C032684F-3C3F-4551-A4FE-AAB17348CBF0}" type="datetimeFigureOut">
               <a:rPr lang="sv-SE" smtClean="0"/>
-              <a:t>2023-09-21</a:t>
+              <a:t>2023-09-22</a:t>
             </a:fld>
             <a:endParaRPr lang="sv-SE"/>
           </a:p>
@@ -2688,7 +2690,7 @@
           <a:p>
             <a:fld id="{C032684F-3C3F-4551-A4FE-AAB17348CBF0}" type="datetimeFigureOut">
               <a:rPr lang="sv-SE" smtClean="0"/>
-              <a:t>2023-09-21</a:t>
+              <a:t>2023-09-22</a:t>
             </a:fld>
             <a:endParaRPr lang="sv-SE"/>
           </a:p>
@@ -2931,7 +2933,7 @@
           <a:p>
             <a:fld id="{C032684F-3C3F-4551-A4FE-AAB17348CBF0}" type="datetimeFigureOut">
               <a:rPr lang="sv-SE" smtClean="0"/>
-              <a:t>2023-09-21</a:t>
+              <a:t>2023-09-22</a:t>
             </a:fld>
             <a:endParaRPr lang="sv-SE"/>
           </a:p>
@@ -3439,7 +3441,10 @@
           <a:lstStyle/>
           <a:p>
             <a:pPr algn="ctr"/>
-            <a:endParaRPr lang="sv-SE"/>
+            <a:r>
+              <a:rPr lang="sv-SE" dirty="0"/>
+              <a:t>Screen</a:t>
+            </a:r>
           </a:p>
         </p:txBody>
       </p:sp>
@@ -3490,7 +3495,14 @@
           <a:lstStyle/>
           <a:p>
             <a:pPr algn="ctr"/>
-            <a:endParaRPr lang="sv-SE"/>
+            <a:r>
+              <a:rPr lang="sv-SE" sz="2400" dirty="0">
+                <a:latin typeface="Amasis MT Pro Medium" panose="020B0604020202020204" pitchFamily="18" charset="0"/>
+                <a:ea typeface="ADLaM Display" panose="020B0604020202020204" pitchFamily="2" charset="0"/>
+                <a:cs typeface="ADLaM Display" panose="020B0604020202020204" pitchFamily="2" charset="0"/>
+              </a:rPr>
+              <a:t>TV</a:t>
+            </a:r>
           </a:p>
         </p:txBody>
       </p:sp>
@@ -3541,7 +3553,10 @@
           <a:lstStyle/>
           <a:p>
             <a:pPr algn="ctr"/>
-            <a:endParaRPr lang="sv-SE"/>
+            <a:r>
+              <a:rPr lang="sv-SE" dirty="0"/>
+              <a:t>Screen</a:t>
+            </a:r>
           </a:p>
         </p:txBody>
       </p:sp>
@@ -3625,7 +3640,7 @@
         </p:blipFill>
         <p:spPr bwMode="auto">
           <a:xfrm>
-            <a:off x="5535872" y="808221"/>
+            <a:off x="5535872" y="545759"/>
             <a:ext cx="1120255" cy="1116521"/>
           </a:xfrm>
           <a:prstGeom prst="rect">
@@ -3653,6 +3668,7 @@
             </a:extLst>
           </p:cNvPr>
           <p:cNvCxnSpPr>
+            <a:cxnSpLocks/>
             <a:stCxn id="10" idx="3"/>
           </p:cNvCxnSpPr>
           <p:nvPr/>
@@ -3660,7 +3676,7 @@
         <p:spPr>
           <a:xfrm flipV="1">
             <a:off x="2660071" y="3428999"/>
-            <a:ext cx="1530929" cy="1"/>
+            <a:ext cx="1268102" cy="1"/>
           </a:xfrm>
           <a:prstGeom prst="bentConnector3">
             <a:avLst/>
@@ -3687,6 +3703,414 @@
           </a:fontRef>
         </p:style>
       </p:cxnSp>
+      <p:cxnSp>
+        <p:nvCxnSpPr>
+          <p:cNvPr id="3" name="Connector: Elbow 2">
+            <a:extLst>
+              <a:ext uri="{FF2B5EF4-FFF2-40B4-BE49-F238E27FC236}">
+                <a16:creationId xmlns:a16="http://schemas.microsoft.com/office/drawing/2014/main" id="{243890FA-DB18-E885-1E70-F9B8B0F535BE}"/>
+              </a:ext>
+            </a:extLst>
+          </p:cNvPr>
+          <p:cNvCxnSpPr>
+            <a:cxnSpLocks/>
+            <a:stCxn id="9" idx="3"/>
+          </p:cNvCxnSpPr>
+          <p:nvPr/>
+        </p:nvCxnSpPr>
+        <p:spPr>
+          <a:xfrm>
+            <a:off x="2660071" y="1555404"/>
+            <a:ext cx="1268102" cy="1203960"/>
+          </a:xfrm>
+          <a:prstGeom prst="bentConnector3">
+            <a:avLst/>
+          </a:prstGeom>
+          <a:ln>
+            <a:solidFill>
+              <a:schemeClr val="bg1"/>
+            </a:solidFill>
+            <a:tailEnd type="triangle"/>
+          </a:ln>
+        </p:spPr>
+        <p:style>
+          <a:lnRef idx="1">
+            <a:schemeClr val="accent1"/>
+          </a:lnRef>
+          <a:fillRef idx="0">
+            <a:schemeClr val="accent1"/>
+          </a:fillRef>
+          <a:effectRef idx="0">
+            <a:schemeClr val="accent1"/>
+          </a:effectRef>
+          <a:fontRef idx="minor">
+            <a:schemeClr val="tx1"/>
+          </a:fontRef>
+        </p:style>
+      </p:cxnSp>
+      <p:cxnSp>
+        <p:nvCxnSpPr>
+          <p:cNvPr id="4" name="Connector: Elbow 3">
+            <a:extLst>
+              <a:ext uri="{FF2B5EF4-FFF2-40B4-BE49-F238E27FC236}">
+                <a16:creationId xmlns:a16="http://schemas.microsoft.com/office/drawing/2014/main" id="{DC997F84-A4F5-B456-8959-8BEA131C5468}"/>
+              </a:ext>
+            </a:extLst>
+          </p:cNvPr>
+          <p:cNvCxnSpPr>
+            <a:cxnSpLocks/>
+          </p:cNvCxnSpPr>
+          <p:nvPr/>
+        </p:nvCxnSpPr>
+        <p:spPr>
+          <a:xfrm flipV="1">
+            <a:off x="2660071" y="4098635"/>
+            <a:ext cx="1354580" cy="1205675"/>
+          </a:xfrm>
+          <a:prstGeom prst="bentConnector3">
+            <a:avLst/>
+          </a:prstGeom>
+          <a:ln>
+            <a:solidFill>
+              <a:schemeClr val="bg1"/>
+            </a:solidFill>
+            <a:tailEnd type="triangle"/>
+          </a:ln>
+        </p:spPr>
+        <p:style>
+          <a:lnRef idx="1">
+            <a:schemeClr val="accent1"/>
+          </a:lnRef>
+          <a:fillRef idx="0">
+            <a:schemeClr val="accent1"/>
+          </a:fillRef>
+          <a:effectRef idx="0">
+            <a:schemeClr val="accent1"/>
+          </a:effectRef>
+          <a:fontRef idx="minor">
+            <a:schemeClr val="tx1"/>
+          </a:fontRef>
+        </p:style>
+      </p:cxnSp>
+      <p:sp>
+        <p:nvSpPr>
+          <p:cNvPr id="16" name="TextBox 15">
+            <a:extLst>
+              <a:ext uri="{FF2B5EF4-FFF2-40B4-BE49-F238E27FC236}">
+                <a16:creationId xmlns:a16="http://schemas.microsoft.com/office/drawing/2014/main" id="{32B72029-7D74-0D13-1F58-00BAEF0F77C2}"/>
+              </a:ext>
+            </a:extLst>
+          </p:cNvPr>
+          <p:cNvSpPr txBox="1"/>
+          <p:nvPr/>
+        </p:nvSpPr>
+        <p:spPr>
+          <a:xfrm>
+            <a:off x="4711699" y="1742032"/>
+            <a:ext cx="2768600" cy="276999"/>
+          </a:xfrm>
+          <a:prstGeom prst="rect">
+            <a:avLst/>
+          </a:prstGeom>
+          <a:noFill/>
+        </p:spPr>
+        <p:txBody>
+          <a:bodyPr wrap="square" rtlCol="0">
+            <a:spAutoFit/>
+          </a:bodyPr>
+          <a:lstStyle/>
+          <a:p>
+            <a:r>
+              <a:rPr lang="sv-SE" sz="1200" dirty="0">
+                <a:solidFill>
+                  <a:schemeClr val="bg1"/>
+                </a:solidFill>
+              </a:rPr>
+              <a:t>C</a:t>
+            </a:r>
+            <a:r>
+              <a:rPr lang="en-US" sz="1200" dirty="0">
+                <a:solidFill>
+                  <a:schemeClr val="bg1"/>
+                </a:solidFill>
+              </a:rPr>
+              <a:t>:\Program Files (x86)\Steam\steam.exe</a:t>
+            </a:r>
+            <a:endParaRPr lang="sv-SE" sz="1200" dirty="0">
+              <a:solidFill>
+                <a:schemeClr val="bg1"/>
+              </a:solidFill>
+            </a:endParaRPr>
+          </a:p>
+        </p:txBody>
+      </p:sp>
+      <p:sp>
+        <p:nvSpPr>
+          <p:cNvPr id="17" name="TextBox 16">
+            <a:extLst>
+              <a:ext uri="{FF2B5EF4-FFF2-40B4-BE49-F238E27FC236}">
+                <a16:creationId xmlns:a16="http://schemas.microsoft.com/office/drawing/2014/main" id="{95641002-CD4D-CBF0-22E4-F8B62EBFBE31}"/>
+              </a:ext>
+            </a:extLst>
+          </p:cNvPr>
+          <p:cNvSpPr txBox="1"/>
+          <p:nvPr/>
+        </p:nvSpPr>
+        <p:spPr>
+          <a:xfrm>
+            <a:off x="952929" y="1948041"/>
+            <a:ext cx="1109599" cy="276999"/>
+          </a:xfrm>
+          <a:prstGeom prst="rect">
+            <a:avLst/>
+          </a:prstGeom>
+          <a:noFill/>
+        </p:spPr>
+        <p:txBody>
+          <a:bodyPr wrap="none" rtlCol="0">
+            <a:spAutoFit/>
+          </a:bodyPr>
+          <a:lstStyle/>
+          <a:p>
+            <a:r>
+              <a:rPr lang="en-US" sz="1200" dirty="0">
+                <a:solidFill>
+                  <a:schemeClr val="bg1"/>
+                </a:solidFill>
+              </a:rPr>
+              <a:t>\\ID\SMG1493</a:t>
+            </a:r>
+            <a:endParaRPr lang="sv-SE" sz="1200" dirty="0">
+              <a:solidFill>
+                <a:schemeClr val="bg1"/>
+              </a:solidFill>
+            </a:endParaRPr>
+          </a:p>
+        </p:txBody>
+      </p:sp>
+      <p:sp>
+        <p:nvSpPr>
+          <p:cNvPr id="18" name="TextBox 17">
+            <a:extLst>
+              <a:ext uri="{FF2B5EF4-FFF2-40B4-BE49-F238E27FC236}">
+                <a16:creationId xmlns:a16="http://schemas.microsoft.com/office/drawing/2014/main" id="{19D2D771-7DF9-F083-CEE2-0A4EA1A6EF6B}"/>
+              </a:ext>
+            </a:extLst>
+          </p:cNvPr>
+          <p:cNvSpPr txBox="1"/>
+          <p:nvPr/>
+        </p:nvSpPr>
+        <p:spPr>
+          <a:xfrm>
+            <a:off x="1023622" y="3821636"/>
+            <a:ext cx="968214" cy="276999"/>
+          </a:xfrm>
+          <a:prstGeom prst="rect">
+            <a:avLst/>
+          </a:prstGeom>
+          <a:noFill/>
+        </p:spPr>
+        <p:txBody>
+          <a:bodyPr wrap="none" rtlCol="0">
+            <a:spAutoFit/>
+          </a:bodyPr>
+          <a:lstStyle/>
+          <a:p>
+            <a:r>
+              <a:rPr lang="en-US" sz="1200" dirty="0">
+                <a:solidFill>
+                  <a:schemeClr val="bg1"/>
+                </a:solidFill>
+              </a:rPr>
+              <a:t>\\ID\LG9158</a:t>
+            </a:r>
+            <a:endParaRPr lang="sv-SE" sz="1200" dirty="0">
+              <a:solidFill>
+                <a:schemeClr val="bg1"/>
+              </a:solidFill>
+            </a:endParaRPr>
+          </a:p>
+        </p:txBody>
+      </p:sp>
+      <p:sp>
+        <p:nvSpPr>
+          <p:cNvPr id="19" name="TextBox 18">
+            <a:extLst>
+              <a:ext uri="{FF2B5EF4-FFF2-40B4-BE49-F238E27FC236}">
+                <a16:creationId xmlns:a16="http://schemas.microsoft.com/office/drawing/2014/main" id="{5C7683E4-B667-075B-0975-6046D605BB12}"/>
+              </a:ext>
+            </a:extLst>
+          </p:cNvPr>
+          <p:cNvSpPr txBox="1"/>
+          <p:nvPr/>
+        </p:nvSpPr>
+        <p:spPr>
+          <a:xfrm>
+            <a:off x="973649" y="5695233"/>
+            <a:ext cx="1082219" cy="276999"/>
+          </a:xfrm>
+          <a:prstGeom prst="rect">
+            <a:avLst/>
+          </a:prstGeom>
+          <a:noFill/>
+        </p:spPr>
+        <p:txBody>
+          <a:bodyPr wrap="none" rtlCol="0">
+            <a:spAutoFit/>
+          </a:bodyPr>
+          <a:lstStyle/>
+          <a:p>
+            <a:r>
+              <a:rPr lang="en-US" sz="1200" dirty="0">
+                <a:solidFill>
+                  <a:schemeClr val="bg1"/>
+                </a:solidFill>
+              </a:rPr>
+              <a:t>\\ID\AOC7205</a:t>
+            </a:r>
+            <a:endParaRPr lang="sv-SE" sz="1200" dirty="0">
+              <a:solidFill>
+                <a:schemeClr val="bg1"/>
+              </a:solidFill>
+            </a:endParaRPr>
+          </a:p>
+        </p:txBody>
+      </p:sp>
+      <p:cxnSp>
+        <p:nvCxnSpPr>
+          <p:cNvPr id="23" name="Connector: Elbow 22">
+            <a:extLst>
+              <a:ext uri="{FF2B5EF4-FFF2-40B4-BE49-F238E27FC236}">
+                <a16:creationId xmlns:a16="http://schemas.microsoft.com/office/drawing/2014/main" id="{96848E42-7C1E-361F-8254-9A6FA980466B}"/>
+              </a:ext>
+            </a:extLst>
+          </p:cNvPr>
+          <p:cNvCxnSpPr>
+            <a:cxnSpLocks/>
+          </p:cNvCxnSpPr>
+          <p:nvPr/>
+        </p:nvCxnSpPr>
+        <p:spPr>
+          <a:xfrm flipV="1">
+            <a:off x="8088923" y="3554845"/>
+            <a:ext cx="1075174" cy="2271"/>
+          </a:xfrm>
+          <a:prstGeom prst="bentConnector3">
+            <a:avLst/>
+          </a:prstGeom>
+          <a:ln>
+            <a:solidFill>
+              <a:schemeClr val="bg1"/>
+            </a:solidFill>
+            <a:tailEnd type="triangle"/>
+          </a:ln>
+        </p:spPr>
+        <p:style>
+          <a:lnRef idx="1">
+            <a:schemeClr val="accent1"/>
+          </a:lnRef>
+          <a:fillRef idx="0">
+            <a:schemeClr val="accent1"/>
+          </a:fillRef>
+          <a:effectRef idx="0">
+            <a:schemeClr val="accent1"/>
+          </a:effectRef>
+          <a:fontRef idx="minor">
+            <a:schemeClr val="tx1"/>
+          </a:fontRef>
+        </p:style>
+      </p:cxnSp>
+      <p:pic>
+        <p:nvPicPr>
+          <p:cNvPr id="26" name="Picture 2" descr="Steam Logo PNG Vector (EPS) Free Download">
+            <a:extLst>
+              <a:ext uri="{FF2B5EF4-FFF2-40B4-BE49-F238E27FC236}">
+                <a16:creationId xmlns:a16="http://schemas.microsoft.com/office/drawing/2014/main" id="{5C4D943E-84A7-CECD-20B4-D2A3D5E350FF}"/>
+              </a:ext>
+            </a:extLst>
+          </p:cNvPr>
+          <p:cNvPicPr>
+            <a:picLocks noChangeAspect="1" noChangeArrowheads="1"/>
+          </p:cNvPicPr>
+          <p:nvPr/>
+        </p:nvPicPr>
+        <p:blipFill>
+          <a:blip r:embed="rId3">
+            <a:extLst>
+              <a:ext uri="{28A0092B-C50C-407E-A947-70E740481C1C}">
+                <a14:useLocalDpi xmlns:a14="http://schemas.microsoft.com/office/drawing/2010/main" val="0"/>
+              </a:ext>
+            </a:extLst>
+          </a:blip>
+          <a:srcRect/>
+          <a:stretch>
+            <a:fillRect/>
+          </a:stretch>
+        </p:blipFill>
+        <p:spPr bwMode="auto">
+          <a:xfrm>
+            <a:off x="9990110" y="2996584"/>
+            <a:ext cx="1120255" cy="1116521"/>
+          </a:xfrm>
+          <a:prstGeom prst="rect">
+            <a:avLst/>
+          </a:prstGeom>
+          <a:noFill/>
+          <a:extLst>
+            <a:ext uri="{909E8E84-426E-40DD-AFC4-6F175D3DCCD1}">
+              <a14:hiddenFill xmlns:a14="http://schemas.microsoft.com/office/drawing/2010/main">
+                <a:solidFill>
+                  <a:srgbClr val="FFFFFF"/>
+                </a:solidFill>
+              </a14:hiddenFill>
+            </a:ext>
+          </a:extLst>
+        </p:spPr>
+      </p:pic>
+      <p:sp>
+        <p:nvSpPr>
+          <p:cNvPr id="27" name="TextBox 26">
+            <a:extLst>
+              <a:ext uri="{FF2B5EF4-FFF2-40B4-BE49-F238E27FC236}">
+                <a16:creationId xmlns:a16="http://schemas.microsoft.com/office/drawing/2014/main" id="{DFB88911-651E-2FD9-3D6F-F78A067FC3A4}"/>
+              </a:ext>
+            </a:extLst>
+          </p:cNvPr>
+          <p:cNvSpPr txBox="1"/>
+          <p:nvPr/>
+        </p:nvSpPr>
+        <p:spPr>
+          <a:xfrm>
+            <a:off x="10066130" y="4185625"/>
+            <a:ext cx="968214" cy="276999"/>
+          </a:xfrm>
+          <a:prstGeom prst="rect">
+            <a:avLst/>
+          </a:prstGeom>
+          <a:noFill/>
+        </p:spPr>
+        <p:txBody>
+          <a:bodyPr wrap="none" rtlCol="0">
+            <a:spAutoFit/>
+          </a:bodyPr>
+          <a:lstStyle/>
+          <a:p>
+            <a:r>
+              <a:rPr lang="en-US" sz="1200" dirty="0">
+                <a:solidFill>
+                  <a:schemeClr val="bg1"/>
+                </a:solidFill>
+              </a:rPr>
+              <a:t>\\ID\LG9158</a:t>
+            </a:r>
+            <a:endParaRPr lang="sv-SE" sz="1200" dirty="0">
+              <a:solidFill>
+                <a:schemeClr val="bg1"/>
+              </a:solidFill>
+            </a:endParaRPr>
+          </a:p>
+        </p:txBody>
+      </p:sp>
     </p:spTree>
     <p:extLst>
       <p:ext uri="{BB962C8B-B14F-4D97-AF65-F5344CB8AC3E}">
@@ -3818,9 +4242,9 @@
                                 </p:cTn>
                               </p:par>
                               <p:par>
-                                <p:cTn id="12" presetID="2" presetClass="entr" presetSubtype="8" decel="100000" fill="hold" grpId="0" nodeType="withEffect">
+                                <p:cTn id="12" presetID="2" presetClass="entr" presetSubtype="8" decel="100000" fill="hold" nodeType="withEffect">
                                   <p:stCondLst>
-                                    <p:cond delay="100"/>
+                                    <p:cond delay="0"/>
                                   </p:stCondLst>
                                   <p:childTnLst>
                                     <p:set>
@@ -3831,7 +4255,11 @@
                                           </p:stCondLst>
                                         </p:cTn>
                                         <p:tgtEl>
-                                          <p:spTgt spid="10"/>
+                                          <p:spTgt spid="17">
+                                            <p:txEl>
+                                              <p:pRg st="0" end="0"/>
+                                            </p:txEl>
+                                          </p:spTgt>
                                         </p:tgtEl>
                                         <p:attrNameLst>
                                           <p:attrName>style.visibility</p:attrName>
@@ -3845,7 +4273,11 @@
                                       <p:cBhvr additive="base">
                                         <p:cTn id="14" dur="800" fill="hold"/>
                                         <p:tgtEl>
-                                          <p:spTgt spid="10"/>
+                                          <p:spTgt spid="17">
+                                            <p:txEl>
+                                              <p:pRg st="0" end="0"/>
+                                            </p:txEl>
+                                          </p:spTgt>
                                         </p:tgtEl>
                                         <p:attrNameLst>
                                           <p:attrName>ppt_x</p:attrName>
@@ -3868,7 +4300,11 @@
                                       <p:cBhvr additive="base">
                                         <p:cTn id="15" dur="800" fill="hold"/>
                                         <p:tgtEl>
-                                          <p:spTgt spid="10"/>
+                                          <p:spTgt spid="17">
+                                            <p:txEl>
+                                              <p:pRg st="0" end="0"/>
+                                            </p:txEl>
+                                          </p:spTgt>
                                         </p:tgtEl>
                                         <p:attrNameLst>
                                           <p:attrName>ppt_y</p:attrName>
@@ -3893,7 +4329,7 @@
                               <p:par>
                                 <p:cTn id="16" presetID="2" presetClass="entr" presetSubtype="8" decel="100000" fill="hold" grpId="0" nodeType="withEffect">
                                   <p:stCondLst>
-                                    <p:cond delay="200"/>
+                                    <p:cond delay="100"/>
                                   </p:stCondLst>
                                   <p:childTnLst>
                                     <p:set>
@@ -3904,7 +4340,7 @@
                                           </p:stCondLst>
                                         </p:cTn>
                                         <p:tgtEl>
-                                          <p:spTgt spid="11"/>
+                                          <p:spTgt spid="10"/>
                                         </p:tgtEl>
                                         <p:attrNameLst>
                                           <p:attrName>style.visibility</p:attrName>
@@ -3916,9 +4352,9 @@
                                     </p:set>
                                     <p:anim calcmode="lin" valueType="num">
                                       <p:cBhvr additive="base">
-                                        <p:cTn id="18" dur="900" fill="hold"/>
-                                        <p:tgtEl>
-                                          <p:spTgt spid="11"/>
+                                        <p:cTn id="18" dur="800" fill="hold"/>
+                                        <p:tgtEl>
+                                          <p:spTgt spid="10"/>
                                         </p:tgtEl>
                                         <p:attrNameLst>
                                           <p:attrName>ppt_x</p:attrName>
@@ -3939,9 +4375,9 @@
                                     </p:anim>
                                     <p:anim calcmode="lin" valueType="num">
                                       <p:cBhvr additive="base">
-                                        <p:cTn id="19" dur="900" fill="hold"/>
-                                        <p:tgtEl>
-                                          <p:spTgt spid="11"/>
+                                        <p:cTn id="19" dur="800" fill="hold"/>
+                                        <p:tgtEl>
+                                          <p:spTgt spid="10"/>
                                         </p:tgtEl>
                                         <p:attrNameLst>
                                           <p:attrName>ppt_y</p:attrName>
@@ -3963,24 +4399,348 @@
                                   </p:childTnLst>
                                 </p:cTn>
                               </p:par>
+                              <p:par>
+                                <p:cTn id="20" presetID="2" presetClass="entr" presetSubtype="8" decel="100000" fill="hold" grpId="0" nodeType="withEffect">
+                                  <p:stCondLst>
+                                    <p:cond delay="100"/>
+                                  </p:stCondLst>
+                                  <p:childTnLst>
+                                    <p:set>
+                                      <p:cBhvr>
+                                        <p:cTn id="21" dur="1" fill="hold">
+                                          <p:stCondLst>
+                                            <p:cond delay="0"/>
+                                          </p:stCondLst>
+                                        </p:cTn>
+                                        <p:tgtEl>
+                                          <p:spTgt spid="18"/>
+                                        </p:tgtEl>
+                                        <p:attrNameLst>
+                                          <p:attrName>style.visibility</p:attrName>
+                                        </p:attrNameLst>
+                                      </p:cBhvr>
+                                      <p:to>
+                                        <p:strVal val="visible"/>
+                                      </p:to>
+                                    </p:set>
+                                    <p:anim calcmode="lin" valueType="num">
+                                      <p:cBhvr additive="base">
+                                        <p:cTn id="22" dur="800" fill="hold"/>
+                                        <p:tgtEl>
+                                          <p:spTgt spid="18"/>
+                                        </p:tgtEl>
+                                        <p:attrNameLst>
+                                          <p:attrName>ppt_x</p:attrName>
+                                        </p:attrNameLst>
+                                      </p:cBhvr>
+                                      <p:tavLst>
+                                        <p:tav tm="0">
+                                          <p:val>
+                                            <p:strVal val="0-#ppt_w/2"/>
+                                          </p:val>
+                                        </p:tav>
+                                        <p:tav tm="100000">
+                                          <p:val>
+                                            <p:strVal val="#ppt_x"/>
+                                          </p:val>
+                                        </p:tav>
+                                      </p:tavLst>
+                                    </p:anim>
+                                    <p:anim calcmode="lin" valueType="num">
+                                      <p:cBhvr additive="base">
+                                        <p:cTn id="23" dur="800" fill="hold"/>
+                                        <p:tgtEl>
+                                          <p:spTgt spid="18"/>
+                                        </p:tgtEl>
+                                        <p:attrNameLst>
+                                          <p:attrName>ppt_y</p:attrName>
+                                        </p:attrNameLst>
+                                      </p:cBhvr>
+                                      <p:tavLst>
+                                        <p:tav tm="0">
+                                          <p:val>
+                                            <p:strVal val="#ppt_y"/>
+                                          </p:val>
+                                        </p:tav>
+                                        <p:tav tm="100000">
+                                          <p:val>
+                                            <p:strVal val="#ppt_y"/>
+                                          </p:val>
+                                        </p:tav>
+                                      </p:tavLst>
+                                    </p:anim>
+                                  </p:childTnLst>
+                                </p:cTn>
+                              </p:par>
+                              <p:par>
+                                <p:cTn id="24" presetID="2" presetClass="entr" presetSubtype="8" decel="100000" fill="hold" grpId="0" nodeType="withEffect">
+                                  <p:stCondLst>
+                                    <p:cond delay="200"/>
+                                  </p:stCondLst>
+                                  <p:childTnLst>
+                                    <p:set>
+                                      <p:cBhvr>
+                                        <p:cTn id="25" dur="1" fill="hold">
+                                          <p:stCondLst>
+                                            <p:cond delay="0"/>
+                                          </p:stCondLst>
+                                        </p:cTn>
+                                        <p:tgtEl>
+                                          <p:spTgt spid="11"/>
+                                        </p:tgtEl>
+                                        <p:attrNameLst>
+                                          <p:attrName>style.visibility</p:attrName>
+                                        </p:attrNameLst>
+                                      </p:cBhvr>
+                                      <p:to>
+                                        <p:strVal val="visible"/>
+                                      </p:to>
+                                    </p:set>
+                                    <p:anim calcmode="lin" valueType="num">
+                                      <p:cBhvr additive="base">
+                                        <p:cTn id="26" dur="900" fill="hold"/>
+                                        <p:tgtEl>
+                                          <p:spTgt spid="11"/>
+                                        </p:tgtEl>
+                                        <p:attrNameLst>
+                                          <p:attrName>ppt_x</p:attrName>
+                                        </p:attrNameLst>
+                                      </p:cBhvr>
+                                      <p:tavLst>
+                                        <p:tav tm="0">
+                                          <p:val>
+                                            <p:strVal val="0-#ppt_w/2"/>
+                                          </p:val>
+                                        </p:tav>
+                                        <p:tav tm="100000">
+                                          <p:val>
+                                            <p:strVal val="#ppt_x"/>
+                                          </p:val>
+                                        </p:tav>
+                                      </p:tavLst>
+                                    </p:anim>
+                                    <p:anim calcmode="lin" valueType="num">
+                                      <p:cBhvr additive="base">
+                                        <p:cTn id="27" dur="900" fill="hold"/>
+                                        <p:tgtEl>
+                                          <p:spTgt spid="11"/>
+                                        </p:tgtEl>
+                                        <p:attrNameLst>
+                                          <p:attrName>ppt_y</p:attrName>
+                                        </p:attrNameLst>
+                                      </p:cBhvr>
+                                      <p:tavLst>
+                                        <p:tav tm="0">
+                                          <p:val>
+                                            <p:strVal val="#ppt_y"/>
+                                          </p:val>
+                                        </p:tav>
+                                        <p:tav tm="100000">
+                                          <p:val>
+                                            <p:strVal val="#ppt_y"/>
+                                          </p:val>
+                                        </p:tav>
+                                      </p:tavLst>
+                                    </p:anim>
+                                  </p:childTnLst>
+                                </p:cTn>
+                              </p:par>
+                              <p:par>
+                                <p:cTn id="28" presetID="2" presetClass="entr" presetSubtype="8" decel="100000" fill="hold" grpId="0" nodeType="withEffect">
+                                  <p:stCondLst>
+                                    <p:cond delay="200"/>
+                                  </p:stCondLst>
+                                  <p:childTnLst>
+                                    <p:set>
+                                      <p:cBhvr>
+                                        <p:cTn id="29" dur="1" fill="hold">
+                                          <p:stCondLst>
+                                            <p:cond delay="0"/>
+                                          </p:stCondLst>
+                                        </p:cTn>
+                                        <p:tgtEl>
+                                          <p:spTgt spid="19"/>
+                                        </p:tgtEl>
+                                        <p:attrNameLst>
+                                          <p:attrName>style.visibility</p:attrName>
+                                        </p:attrNameLst>
+                                      </p:cBhvr>
+                                      <p:to>
+                                        <p:strVal val="visible"/>
+                                      </p:to>
+                                    </p:set>
+                                    <p:anim calcmode="lin" valueType="num">
+                                      <p:cBhvr additive="base">
+                                        <p:cTn id="30" dur="900" fill="hold"/>
+                                        <p:tgtEl>
+                                          <p:spTgt spid="19"/>
+                                        </p:tgtEl>
+                                        <p:attrNameLst>
+                                          <p:attrName>ppt_x</p:attrName>
+                                        </p:attrNameLst>
+                                      </p:cBhvr>
+                                      <p:tavLst>
+                                        <p:tav tm="0">
+                                          <p:val>
+                                            <p:strVal val="0-#ppt_w/2"/>
+                                          </p:val>
+                                        </p:tav>
+                                        <p:tav tm="100000">
+                                          <p:val>
+                                            <p:strVal val="#ppt_x"/>
+                                          </p:val>
+                                        </p:tav>
+                                      </p:tavLst>
+                                    </p:anim>
+                                    <p:anim calcmode="lin" valueType="num">
+                                      <p:cBhvr additive="base">
+                                        <p:cTn id="31" dur="900" fill="hold"/>
+                                        <p:tgtEl>
+                                          <p:spTgt spid="19"/>
+                                        </p:tgtEl>
+                                        <p:attrNameLst>
+                                          <p:attrName>ppt_y</p:attrName>
+                                        </p:attrNameLst>
+                                      </p:cBhvr>
+                                      <p:tavLst>
+                                        <p:tav tm="0">
+                                          <p:val>
+                                            <p:strVal val="#ppt_y"/>
+                                          </p:val>
+                                        </p:tav>
+                                        <p:tav tm="100000">
+                                          <p:val>
+                                            <p:strVal val="#ppt_y"/>
+                                          </p:val>
+                                        </p:tav>
+                                      </p:tavLst>
+                                    </p:anim>
+                                  </p:childTnLst>
+                                </p:cTn>
+                              </p:par>
+                              <p:par>
+                                <p:cTn id="32" presetID="10" presetClass="entr" presetSubtype="0" fill="hold" nodeType="withEffect">
+                                  <p:stCondLst>
+                                    <p:cond delay="200"/>
+                                  </p:stCondLst>
+                                  <p:childTnLst>
+                                    <p:set>
+                                      <p:cBhvr>
+                                        <p:cTn id="33" dur="1" fill="hold">
+                                          <p:stCondLst>
+                                            <p:cond delay="0"/>
+                                          </p:stCondLst>
+                                        </p:cTn>
+                                        <p:tgtEl>
+                                          <p:spTgt spid="3"/>
+                                        </p:tgtEl>
+                                        <p:attrNameLst>
+                                          <p:attrName>style.visibility</p:attrName>
+                                        </p:attrNameLst>
+                                      </p:cBhvr>
+                                      <p:to>
+                                        <p:strVal val="visible"/>
+                                      </p:to>
+                                    </p:set>
+                                    <p:animEffect transition="in" filter="fade">
+                                      <p:cBhvr>
+                                        <p:cTn id="34" dur="500"/>
+                                        <p:tgtEl>
+                                          <p:spTgt spid="3"/>
+                                        </p:tgtEl>
+                                      </p:cBhvr>
+                                    </p:animEffect>
+                                  </p:childTnLst>
+                                </p:cTn>
+                              </p:par>
+                              <p:par>
+                                <p:cTn id="35" presetID="10" presetClass="entr" presetSubtype="0" fill="hold" nodeType="withEffect">
+                                  <p:stCondLst>
+                                    <p:cond delay="200"/>
+                                  </p:stCondLst>
+                                  <p:childTnLst>
+                                    <p:set>
+                                      <p:cBhvr>
+                                        <p:cTn id="36" dur="1" fill="hold">
+                                          <p:stCondLst>
+                                            <p:cond delay="0"/>
+                                          </p:stCondLst>
+                                        </p:cTn>
+                                        <p:tgtEl>
+                                          <p:spTgt spid="4"/>
+                                        </p:tgtEl>
+                                        <p:attrNameLst>
+                                          <p:attrName>style.visibility</p:attrName>
+                                        </p:attrNameLst>
+                                      </p:cBhvr>
+                                      <p:to>
+                                        <p:strVal val="visible"/>
+                                      </p:to>
+                                    </p:set>
+                                    <p:animEffect transition="in" filter="fade">
+                                      <p:cBhvr>
+                                        <p:cTn id="37" dur="500"/>
+                                        <p:tgtEl>
+                                          <p:spTgt spid="4"/>
+                                        </p:tgtEl>
+                                      </p:cBhvr>
+                                    </p:animEffect>
+                                  </p:childTnLst>
+                                </p:cTn>
+                              </p:par>
+                              <p:par>
+                                <p:cTn id="38" presetID="10" presetClass="entr" presetSubtype="0" fill="hold" nodeType="withEffect">
+                                  <p:stCondLst>
+                                    <p:cond delay="200"/>
+                                  </p:stCondLst>
+                                  <p:childTnLst>
+                                    <p:set>
+                                      <p:cBhvr>
+                                        <p:cTn id="39" dur="1" fill="hold">
+                                          <p:stCondLst>
+                                            <p:cond delay="0"/>
+                                          </p:stCondLst>
+                                        </p:cTn>
+                                        <p:tgtEl>
+                                          <p:spTgt spid="15"/>
+                                        </p:tgtEl>
+                                        <p:attrNameLst>
+                                          <p:attrName>style.visibility</p:attrName>
+                                        </p:attrNameLst>
+                                      </p:cBhvr>
+                                      <p:to>
+                                        <p:strVal val="visible"/>
+                                      </p:to>
+                                    </p:set>
+                                    <p:animEffect transition="in" filter="fade">
+                                      <p:cBhvr>
+                                        <p:cTn id="40" dur="500"/>
+                                        <p:tgtEl>
+                                          <p:spTgt spid="15"/>
+                                        </p:tgtEl>
+                                      </p:cBhvr>
+                                    </p:animEffect>
+                                  </p:childTnLst>
+                                </p:cTn>
+                              </p:par>
                             </p:childTnLst>
                           </p:cTn>
                         </p:par>
                         <p:par>
-                          <p:cTn id="20" fill="hold">
+                          <p:cTn id="41" fill="hold">
                             <p:stCondLst>
                               <p:cond delay="2100"/>
                             </p:stCondLst>
                             <p:childTnLst>
                               <p:par>
-                                <p:cTn id="21" presetID="10" presetClass="entr" presetSubtype="0" fill="hold" grpId="0" nodeType="afterEffect">
+                                <p:cTn id="42" presetID="10" presetClass="entr" presetSubtype="0" fill="hold" grpId="0" nodeType="afterEffect">
                                   <p:stCondLst>
                                     <p:cond delay="0"/>
                                   </p:stCondLst>
                                   <p:childTnLst>
                                     <p:set>
                                       <p:cBhvr>
-                                        <p:cTn id="22" dur="1" fill="hold">
+                                        <p:cTn id="43" dur="1" fill="hold">
                                           <p:stCondLst>
                                             <p:cond delay="0"/>
                                           </p:stCondLst>
@@ -3998,9 +4758,220 @@
                                     </p:set>
                                     <p:animEffect transition="in" filter="fade">
                                       <p:cBhvr>
-                                        <p:cTn id="23" dur="500"/>
+                                        <p:cTn id="44" dur="500"/>
                                         <p:tgtEl>
                                           <p:spTgt spid="13"/>
+                                        </p:tgtEl>
+                                      </p:cBhvr>
+                                    </p:animEffect>
+                                  </p:childTnLst>
+                                </p:cTn>
+                              </p:par>
+                            </p:childTnLst>
+                          </p:cTn>
+                        </p:par>
+                      </p:childTnLst>
+                    </p:cTn>
+                  </p:par>
+                  <p:par>
+                    <p:cTn id="45" fill="hold">
+                      <p:stCondLst>
+                        <p:cond delay="indefinite"/>
+                      </p:stCondLst>
+                      <p:childTnLst>
+                        <p:par>
+                          <p:cTn id="46" fill="hold">
+                            <p:stCondLst>
+                              <p:cond delay="0"/>
+                            </p:stCondLst>
+                            <p:childTnLst>
+                              <p:par>
+                                <p:cTn id="47" presetID="10" presetClass="entr" presetSubtype="0" fill="hold" nodeType="clickEffect">
+                                  <p:stCondLst>
+                                    <p:cond delay="0"/>
+                                  </p:stCondLst>
+                                  <p:childTnLst>
+                                    <p:set>
+                                      <p:cBhvr>
+                                        <p:cTn id="48" dur="1" fill="hold">
+                                          <p:stCondLst>
+                                            <p:cond delay="0"/>
+                                          </p:stCondLst>
+                                        </p:cTn>
+                                        <p:tgtEl>
+                                          <p:spTgt spid="1026"/>
+                                        </p:tgtEl>
+                                        <p:attrNameLst>
+                                          <p:attrName>style.visibility</p:attrName>
+                                        </p:attrNameLst>
+                                      </p:cBhvr>
+                                      <p:to>
+                                        <p:strVal val="visible"/>
+                                      </p:to>
+                                    </p:set>
+                                    <p:animEffect transition="in" filter="fade">
+                                      <p:cBhvr>
+                                        <p:cTn id="49" dur="500"/>
+                                        <p:tgtEl>
+                                          <p:spTgt spid="1026"/>
+                                        </p:tgtEl>
+                                      </p:cBhvr>
+                                    </p:animEffect>
+                                  </p:childTnLst>
+                                </p:cTn>
+                              </p:par>
+                              <p:par>
+                                <p:cTn id="50" presetID="10" presetClass="entr" presetSubtype="0" fill="hold" grpId="0" nodeType="withEffect">
+                                  <p:stCondLst>
+                                    <p:cond delay="0"/>
+                                  </p:stCondLst>
+                                  <p:childTnLst>
+                                    <p:set>
+                                      <p:cBhvr>
+                                        <p:cTn id="51" dur="1" fill="hold">
+                                          <p:stCondLst>
+                                            <p:cond delay="0"/>
+                                          </p:stCondLst>
+                                        </p:cTn>
+                                        <p:tgtEl>
+                                          <p:spTgt spid="16"/>
+                                        </p:tgtEl>
+                                        <p:attrNameLst>
+                                          <p:attrName>style.visibility</p:attrName>
+                                        </p:attrNameLst>
+                                      </p:cBhvr>
+                                      <p:to>
+                                        <p:strVal val="visible"/>
+                                      </p:to>
+                                    </p:set>
+                                    <p:animEffect transition="in" filter="fade">
+                                      <p:cBhvr>
+                                        <p:cTn id="52" dur="500"/>
+                                        <p:tgtEl>
+                                          <p:spTgt spid="16"/>
+                                        </p:tgtEl>
+                                      </p:cBhvr>
+                                    </p:animEffect>
+                                  </p:childTnLst>
+                                </p:cTn>
+                              </p:par>
+                            </p:childTnLst>
+                          </p:cTn>
+                        </p:par>
+                      </p:childTnLst>
+                    </p:cTn>
+                  </p:par>
+                  <p:par>
+                    <p:cTn id="53" fill="hold">
+                      <p:stCondLst>
+                        <p:cond delay="indefinite"/>
+                      </p:stCondLst>
+                      <p:childTnLst>
+                        <p:par>
+                          <p:cTn id="54" fill="hold">
+                            <p:stCondLst>
+                              <p:cond delay="0"/>
+                            </p:stCondLst>
+                            <p:childTnLst>
+                              <p:par>
+                                <p:cTn id="55" presetID="10" presetClass="entr" presetSubtype="0" fill="hold" nodeType="clickEffect">
+                                  <p:stCondLst>
+                                    <p:cond delay="0"/>
+                                  </p:stCondLst>
+                                  <p:childTnLst>
+                                    <p:set>
+                                      <p:cBhvr>
+                                        <p:cTn id="56" dur="1" fill="hold">
+                                          <p:stCondLst>
+                                            <p:cond delay="0"/>
+                                          </p:stCondLst>
+                                        </p:cTn>
+                                        <p:tgtEl>
+                                          <p:spTgt spid="23"/>
+                                        </p:tgtEl>
+                                        <p:attrNameLst>
+                                          <p:attrName>style.visibility</p:attrName>
+                                        </p:attrNameLst>
+                                      </p:cBhvr>
+                                      <p:to>
+                                        <p:strVal val="visible"/>
+                                      </p:to>
+                                    </p:set>
+                                    <p:animEffect transition="in" filter="fade">
+                                      <p:cBhvr>
+                                        <p:cTn id="57" dur="500"/>
+                                        <p:tgtEl>
+                                          <p:spTgt spid="23"/>
+                                        </p:tgtEl>
+                                      </p:cBhvr>
+                                    </p:animEffect>
+                                  </p:childTnLst>
+                                </p:cTn>
+                              </p:par>
+                              <p:par>
+                                <p:cTn id="58" presetID="10" presetClass="entr" presetSubtype="0" fill="hold" nodeType="withEffect">
+                                  <p:stCondLst>
+                                    <p:cond delay="200"/>
+                                  </p:stCondLst>
+                                  <p:childTnLst>
+                                    <p:set>
+                                      <p:cBhvr>
+                                        <p:cTn id="59" dur="1" fill="hold">
+                                          <p:stCondLst>
+                                            <p:cond delay="0"/>
+                                          </p:stCondLst>
+                                        </p:cTn>
+                                        <p:tgtEl>
+                                          <p:spTgt spid="26"/>
+                                        </p:tgtEl>
+                                        <p:attrNameLst>
+                                          <p:attrName>style.visibility</p:attrName>
+                                        </p:attrNameLst>
+                                      </p:cBhvr>
+                                      <p:to>
+                                        <p:strVal val="visible"/>
+                                      </p:to>
+                                    </p:set>
+                                    <p:animEffect transition="in" filter="fade">
+                                      <p:cBhvr>
+                                        <p:cTn id="60" dur="500"/>
+                                        <p:tgtEl>
+                                          <p:spTgt spid="26"/>
+                                        </p:tgtEl>
+                                      </p:cBhvr>
+                                    </p:animEffect>
+                                  </p:childTnLst>
+                                </p:cTn>
+                              </p:par>
+                              <p:par>
+                                <p:cTn id="61" presetID="10" presetClass="entr" presetSubtype="0" fill="hold" grpId="0" nodeType="withEffect">
+                                  <p:stCondLst>
+                                    <p:cond delay="300"/>
+                                  </p:stCondLst>
+                                  <p:childTnLst>
+                                    <p:set>
+                                      <p:cBhvr>
+                                        <p:cTn id="62" dur="1" fill="hold">
+                                          <p:stCondLst>
+                                            <p:cond delay="0"/>
+                                          </p:stCondLst>
+                                        </p:cTn>
+                                        <p:tgtEl>
+                                          <p:spTgt spid="27"/>
+                                        </p:tgtEl>
+                                        <p:attrNameLst>
+                                          <p:attrName>style.visibility</p:attrName>
+                                        </p:attrNameLst>
+                                      </p:cBhvr>
+                                      <p:to>
+                                        <p:strVal val="visible"/>
+                                      </p:to>
+                                    </p:set>
+                                    <p:animEffect transition="in" filter="fade">
+                                      <p:cBhvr>
+                                        <p:cTn id="63" dur="500"/>
+                                        <p:tgtEl>
+                                          <p:spTgt spid="27"/>
                                         </p:tgtEl>
                                       </p:cBhvr>
                                     </p:animEffect>
@@ -4039,6 +5010,10 @@
       <p:bldP spid="10" grpId="0" animBg="1"/>
       <p:bldP spid="11" grpId="0" animBg="1"/>
       <p:bldP spid="13" grpId="0" animBg="1"/>
+      <p:bldP spid="16" grpId="0"/>
+      <p:bldP spid="18" grpId="0"/>
+      <p:bldP spid="19" grpId="0"/>
+      <p:bldP spid="27" grpId="0"/>
     </p:bldLst>
   </p:timing>
 </p:sld>
@@ -4069,16 +5044,3312 @@
           <a:chExt cx="0" cy="0"/>
         </a:xfrm>
       </p:grpSpPr>
+      <p:pic>
+        <p:nvPicPr>
+          <p:cNvPr id="5" name="Picture 4" descr="A screen with text on it">
+            <a:extLst>
+              <a:ext uri="{FF2B5EF4-FFF2-40B4-BE49-F238E27FC236}">
+                <a16:creationId xmlns:a16="http://schemas.microsoft.com/office/drawing/2014/main" id="{A7F2A094-158D-4622-1919-784BDD5CBE84}"/>
+              </a:ext>
+            </a:extLst>
+          </p:cNvPr>
+          <p:cNvPicPr>
+            <a:picLocks noChangeAspect="1"/>
+          </p:cNvPicPr>
+          <p:nvPr/>
+        </p:nvPicPr>
+        <p:blipFill>
+          <a:blip r:embed="rId2">
+            <a:extLst>
+              <a:ext uri="{28A0092B-C50C-407E-A947-70E740481C1C}">
+                <a14:useLocalDpi xmlns:a14="http://schemas.microsoft.com/office/drawing/2010/main" val="0"/>
+              </a:ext>
+            </a:extLst>
+          </a:blip>
+          <a:stretch>
+            <a:fillRect/>
+          </a:stretch>
+        </p:blipFill>
+        <p:spPr>
+          <a:xfrm>
+            <a:off x="152400" y="5585460"/>
+            <a:ext cx="1868365" cy="1121019"/>
+          </a:xfrm>
+          <a:prstGeom prst="rect">
+            <a:avLst/>
+          </a:prstGeom>
+        </p:spPr>
+      </p:pic>
+      <p:sp>
+        <p:nvSpPr>
+          <p:cNvPr id="9" name="Rectangle: Rounded Corners 8">
+            <a:extLst>
+              <a:ext uri="{FF2B5EF4-FFF2-40B4-BE49-F238E27FC236}">
+                <a16:creationId xmlns:a16="http://schemas.microsoft.com/office/drawing/2014/main" id="{B2A8BC99-A335-01DA-9E84-F69C1C1CF167}"/>
+              </a:ext>
+            </a:extLst>
+          </p:cNvPr>
+          <p:cNvSpPr/>
+          <p:nvPr/>
+        </p:nvSpPr>
+        <p:spPr>
+          <a:xfrm>
+            <a:off x="-2498209" y="885768"/>
+            <a:ext cx="2299855" cy="1339272"/>
+          </a:xfrm>
+          <a:prstGeom prst="roundRect">
+            <a:avLst/>
+          </a:prstGeom>
+          <a:ln>
+            <a:solidFill>
+              <a:schemeClr val="bg1"/>
+            </a:solidFill>
+          </a:ln>
+        </p:spPr>
+        <p:style>
+          <a:lnRef idx="2">
+            <a:schemeClr val="dk1">
+              <a:shade val="50000"/>
+            </a:schemeClr>
+          </a:lnRef>
+          <a:fillRef idx="1">
+            <a:schemeClr val="dk1"/>
+          </a:fillRef>
+          <a:effectRef idx="0">
+            <a:schemeClr val="dk1"/>
+          </a:effectRef>
+          <a:fontRef idx="minor">
+            <a:schemeClr val="lt1"/>
+          </a:fontRef>
+        </p:style>
+        <p:txBody>
+          <a:bodyPr rtlCol="0" anchor="ctr"/>
+          <a:lstStyle/>
+          <a:p>
+            <a:pPr algn="ctr"/>
+            <a:r>
+              <a:rPr lang="sv-SE" dirty="0"/>
+              <a:t>Screen</a:t>
+            </a:r>
+          </a:p>
+        </p:txBody>
+      </p:sp>
+      <p:sp>
+        <p:nvSpPr>
+          <p:cNvPr id="10" name="Rectangle: Rounded Corners 9">
+            <a:extLst>
+              <a:ext uri="{FF2B5EF4-FFF2-40B4-BE49-F238E27FC236}">
+                <a16:creationId xmlns:a16="http://schemas.microsoft.com/office/drawing/2014/main" id="{1D862AFC-948E-C7D6-4710-2BEBB33D3FE2}"/>
+              </a:ext>
+            </a:extLst>
+          </p:cNvPr>
+          <p:cNvSpPr/>
+          <p:nvPr/>
+        </p:nvSpPr>
+        <p:spPr>
+          <a:xfrm>
+            <a:off x="-2498209" y="2759364"/>
+            <a:ext cx="2299855" cy="1339272"/>
+          </a:xfrm>
+          <a:prstGeom prst="roundRect">
+            <a:avLst/>
+          </a:prstGeom>
+          <a:ln>
+            <a:solidFill>
+              <a:schemeClr val="bg1"/>
+            </a:solidFill>
+          </a:ln>
+        </p:spPr>
+        <p:style>
+          <a:lnRef idx="2">
+            <a:schemeClr val="dk1">
+              <a:shade val="50000"/>
+            </a:schemeClr>
+          </a:lnRef>
+          <a:fillRef idx="1">
+            <a:schemeClr val="dk1"/>
+          </a:fillRef>
+          <a:effectRef idx="0">
+            <a:schemeClr val="dk1"/>
+          </a:effectRef>
+          <a:fontRef idx="minor">
+            <a:schemeClr val="lt1"/>
+          </a:fontRef>
+        </p:style>
+        <p:txBody>
+          <a:bodyPr rtlCol="0" anchor="ctr"/>
+          <a:lstStyle/>
+          <a:p>
+            <a:pPr algn="ctr"/>
+            <a:r>
+              <a:rPr lang="sv-SE" sz="2400" dirty="0">
+                <a:latin typeface="Amasis MT Pro Medium" panose="020B0604020202020204" pitchFamily="18" charset="0"/>
+                <a:ea typeface="ADLaM Display" panose="020B0604020202020204" pitchFamily="2" charset="0"/>
+                <a:cs typeface="ADLaM Display" panose="020B0604020202020204" pitchFamily="2" charset="0"/>
+              </a:rPr>
+              <a:t>TV</a:t>
+            </a:r>
+          </a:p>
+        </p:txBody>
+      </p:sp>
+      <p:sp>
+        <p:nvSpPr>
+          <p:cNvPr id="11" name="Rectangle: Rounded Corners 10">
+            <a:extLst>
+              <a:ext uri="{FF2B5EF4-FFF2-40B4-BE49-F238E27FC236}">
+                <a16:creationId xmlns:a16="http://schemas.microsoft.com/office/drawing/2014/main" id="{F8641F0A-EB9F-F42B-86A6-F55AB755570A}"/>
+              </a:ext>
+            </a:extLst>
+          </p:cNvPr>
+          <p:cNvSpPr/>
+          <p:nvPr/>
+        </p:nvSpPr>
+        <p:spPr>
+          <a:xfrm>
+            <a:off x="-2498209" y="4632960"/>
+            <a:ext cx="2299855" cy="1339272"/>
+          </a:xfrm>
+          <a:prstGeom prst="roundRect">
+            <a:avLst/>
+          </a:prstGeom>
+          <a:ln>
+            <a:solidFill>
+              <a:schemeClr val="bg1"/>
+            </a:solidFill>
+          </a:ln>
+        </p:spPr>
+        <p:style>
+          <a:lnRef idx="2">
+            <a:schemeClr val="dk1">
+              <a:shade val="50000"/>
+            </a:schemeClr>
+          </a:lnRef>
+          <a:fillRef idx="1">
+            <a:schemeClr val="dk1"/>
+          </a:fillRef>
+          <a:effectRef idx="0">
+            <a:schemeClr val="dk1"/>
+          </a:effectRef>
+          <a:fontRef idx="minor">
+            <a:schemeClr val="lt1"/>
+          </a:fontRef>
+        </p:style>
+        <p:txBody>
+          <a:bodyPr rtlCol="0" anchor="ctr"/>
+          <a:lstStyle/>
+          <a:p>
+            <a:pPr algn="ctr"/>
+            <a:r>
+              <a:rPr lang="sv-SE" dirty="0"/>
+              <a:t>Screen</a:t>
+            </a:r>
+          </a:p>
+        </p:txBody>
+      </p:sp>
+      <p:pic>
+        <p:nvPicPr>
+          <p:cNvPr id="1026" name="Picture 2" descr="Steam Logo PNG Vector (EPS) Free Download">
+            <a:extLst>
+              <a:ext uri="{FF2B5EF4-FFF2-40B4-BE49-F238E27FC236}">
+                <a16:creationId xmlns:a16="http://schemas.microsoft.com/office/drawing/2014/main" id="{15469F77-583E-19FD-2475-7DE47F3ED649}"/>
+              </a:ext>
+            </a:extLst>
+          </p:cNvPr>
+          <p:cNvPicPr>
+            <a:picLocks noChangeAspect="1" noChangeArrowheads="1"/>
+          </p:cNvPicPr>
+          <p:nvPr/>
+        </p:nvPicPr>
+        <p:blipFill>
+          <a:blip r:embed="rId3">
+            <a:extLst>
+              <a:ext uri="{28A0092B-C50C-407E-A947-70E740481C1C}">
+                <a14:useLocalDpi xmlns:a14="http://schemas.microsoft.com/office/drawing/2010/main" val="0"/>
+              </a:ext>
+            </a:extLst>
+          </a:blip>
+          <a:srcRect/>
+          <a:stretch>
+            <a:fillRect/>
+          </a:stretch>
+        </p:blipFill>
+        <p:spPr bwMode="auto">
+          <a:xfrm>
+            <a:off x="5535872" y="-1714841"/>
+            <a:ext cx="1120255" cy="1116521"/>
+          </a:xfrm>
+          <a:prstGeom prst="rect">
+            <a:avLst/>
+          </a:prstGeom>
+          <a:noFill/>
+          <a:extLst>
+            <a:ext uri="{909E8E84-426E-40DD-AFC4-6F175D3DCCD1}">
+              <a14:hiddenFill xmlns:a14="http://schemas.microsoft.com/office/drawing/2010/main">
+                <a:solidFill>
+                  <a:srgbClr val="FFFFFF"/>
+                </a:solidFill>
+              </a14:hiddenFill>
+            </a:ext>
+          </a:extLst>
+        </p:spPr>
+      </p:pic>
+      <p:sp>
+        <p:nvSpPr>
+          <p:cNvPr id="16" name="TextBox 15">
+            <a:extLst>
+              <a:ext uri="{FF2B5EF4-FFF2-40B4-BE49-F238E27FC236}">
+                <a16:creationId xmlns:a16="http://schemas.microsoft.com/office/drawing/2014/main" id="{32B72029-7D74-0D13-1F58-00BAEF0F77C2}"/>
+              </a:ext>
+            </a:extLst>
+          </p:cNvPr>
+          <p:cNvSpPr txBox="1"/>
+          <p:nvPr/>
+        </p:nvSpPr>
+        <p:spPr>
+          <a:xfrm>
+            <a:off x="4711699" y="-518568"/>
+            <a:ext cx="2768600" cy="276999"/>
+          </a:xfrm>
+          <a:prstGeom prst="rect">
+            <a:avLst/>
+          </a:prstGeom>
+          <a:noFill/>
+        </p:spPr>
+        <p:txBody>
+          <a:bodyPr wrap="square" rtlCol="0">
+            <a:spAutoFit/>
+          </a:bodyPr>
+          <a:lstStyle/>
+          <a:p>
+            <a:r>
+              <a:rPr lang="sv-SE" sz="1200" dirty="0">
+                <a:solidFill>
+                  <a:schemeClr val="bg1"/>
+                </a:solidFill>
+              </a:rPr>
+              <a:t>C</a:t>
+            </a:r>
+            <a:r>
+              <a:rPr lang="en-US" sz="1200" dirty="0">
+                <a:solidFill>
+                  <a:schemeClr val="bg1"/>
+                </a:solidFill>
+              </a:rPr>
+              <a:t>:\Program Files (x86)\Steam\steam.exe</a:t>
+            </a:r>
+            <a:endParaRPr lang="sv-SE" sz="1200" dirty="0">
+              <a:solidFill>
+                <a:schemeClr val="bg1"/>
+              </a:solidFill>
+            </a:endParaRPr>
+          </a:p>
+        </p:txBody>
+      </p:sp>
+      <p:sp>
+        <p:nvSpPr>
+          <p:cNvPr id="17" name="TextBox 16">
+            <a:extLst>
+              <a:ext uri="{FF2B5EF4-FFF2-40B4-BE49-F238E27FC236}">
+                <a16:creationId xmlns:a16="http://schemas.microsoft.com/office/drawing/2014/main" id="{95641002-CD4D-CBF0-22E4-F8B62EBFBE31}"/>
+              </a:ext>
+            </a:extLst>
+          </p:cNvPr>
+          <p:cNvSpPr txBox="1"/>
+          <p:nvPr/>
+        </p:nvSpPr>
+        <p:spPr>
+          <a:xfrm>
+            <a:off x="-1905496" y="1948041"/>
+            <a:ext cx="1109599" cy="276999"/>
+          </a:xfrm>
+          <a:prstGeom prst="rect">
+            <a:avLst/>
+          </a:prstGeom>
+          <a:noFill/>
+        </p:spPr>
+        <p:txBody>
+          <a:bodyPr wrap="none" rtlCol="0">
+            <a:spAutoFit/>
+          </a:bodyPr>
+          <a:lstStyle/>
+          <a:p>
+            <a:r>
+              <a:rPr lang="en-US" sz="1200" dirty="0">
+                <a:solidFill>
+                  <a:schemeClr val="bg1"/>
+                </a:solidFill>
+              </a:rPr>
+              <a:t>\\ID\SMG1493</a:t>
+            </a:r>
+            <a:endParaRPr lang="sv-SE" sz="1200" dirty="0">
+              <a:solidFill>
+                <a:schemeClr val="bg1"/>
+              </a:solidFill>
+            </a:endParaRPr>
+          </a:p>
+        </p:txBody>
+      </p:sp>
+      <p:sp>
+        <p:nvSpPr>
+          <p:cNvPr id="18" name="TextBox 17">
+            <a:extLst>
+              <a:ext uri="{FF2B5EF4-FFF2-40B4-BE49-F238E27FC236}">
+                <a16:creationId xmlns:a16="http://schemas.microsoft.com/office/drawing/2014/main" id="{19D2D771-7DF9-F083-CEE2-0A4EA1A6EF6B}"/>
+              </a:ext>
+            </a:extLst>
+          </p:cNvPr>
+          <p:cNvSpPr txBox="1"/>
+          <p:nvPr/>
+        </p:nvSpPr>
+        <p:spPr>
+          <a:xfrm>
+            <a:off x="-1834803" y="3821636"/>
+            <a:ext cx="968214" cy="276999"/>
+          </a:xfrm>
+          <a:prstGeom prst="rect">
+            <a:avLst/>
+          </a:prstGeom>
+          <a:noFill/>
+        </p:spPr>
+        <p:txBody>
+          <a:bodyPr wrap="none" rtlCol="0">
+            <a:spAutoFit/>
+          </a:bodyPr>
+          <a:lstStyle/>
+          <a:p>
+            <a:r>
+              <a:rPr lang="en-US" sz="1200" dirty="0">
+                <a:solidFill>
+                  <a:schemeClr val="bg1"/>
+                </a:solidFill>
+              </a:rPr>
+              <a:t>\\ID\LG9158</a:t>
+            </a:r>
+            <a:endParaRPr lang="sv-SE" sz="1200" dirty="0">
+              <a:solidFill>
+                <a:schemeClr val="bg1"/>
+              </a:solidFill>
+            </a:endParaRPr>
+          </a:p>
+        </p:txBody>
+      </p:sp>
+      <p:sp>
+        <p:nvSpPr>
+          <p:cNvPr id="19" name="TextBox 18">
+            <a:extLst>
+              <a:ext uri="{FF2B5EF4-FFF2-40B4-BE49-F238E27FC236}">
+                <a16:creationId xmlns:a16="http://schemas.microsoft.com/office/drawing/2014/main" id="{5C7683E4-B667-075B-0975-6046D605BB12}"/>
+              </a:ext>
+            </a:extLst>
+          </p:cNvPr>
+          <p:cNvSpPr txBox="1"/>
+          <p:nvPr/>
+        </p:nvSpPr>
+        <p:spPr>
+          <a:xfrm>
+            <a:off x="-1889392" y="5695233"/>
+            <a:ext cx="1082219" cy="276999"/>
+          </a:xfrm>
+          <a:prstGeom prst="rect">
+            <a:avLst/>
+          </a:prstGeom>
+          <a:noFill/>
+        </p:spPr>
+        <p:txBody>
+          <a:bodyPr wrap="none" rtlCol="0">
+            <a:spAutoFit/>
+          </a:bodyPr>
+          <a:lstStyle/>
+          <a:p>
+            <a:r>
+              <a:rPr lang="en-US" sz="1200" dirty="0">
+                <a:solidFill>
+                  <a:schemeClr val="bg1"/>
+                </a:solidFill>
+              </a:rPr>
+              <a:t>\\ID\AOC7205</a:t>
+            </a:r>
+            <a:endParaRPr lang="sv-SE" sz="1200" dirty="0">
+              <a:solidFill>
+                <a:schemeClr val="bg1"/>
+              </a:solidFill>
+            </a:endParaRPr>
+          </a:p>
+        </p:txBody>
+      </p:sp>
+      <p:pic>
+        <p:nvPicPr>
+          <p:cNvPr id="26" name="Picture 2" descr="Steam Logo PNG Vector (EPS) Free Download">
+            <a:extLst>
+              <a:ext uri="{FF2B5EF4-FFF2-40B4-BE49-F238E27FC236}">
+                <a16:creationId xmlns:a16="http://schemas.microsoft.com/office/drawing/2014/main" id="{5C4D943E-84A7-CECD-20B4-D2A3D5E350FF}"/>
+              </a:ext>
+            </a:extLst>
+          </p:cNvPr>
+          <p:cNvPicPr>
+            <a:picLocks noChangeAspect="1" noChangeArrowheads="1"/>
+          </p:cNvPicPr>
+          <p:nvPr/>
+        </p:nvPicPr>
+        <p:blipFill>
+          <a:blip r:embed="rId3">
+            <a:extLst>
+              <a:ext uri="{28A0092B-C50C-407E-A947-70E740481C1C}">
+                <a14:useLocalDpi xmlns:a14="http://schemas.microsoft.com/office/drawing/2010/main" val="0"/>
+              </a:ext>
+            </a:extLst>
+          </a:blip>
+          <a:srcRect/>
+          <a:stretch>
+            <a:fillRect/>
+          </a:stretch>
+        </p:blipFill>
+        <p:spPr bwMode="auto">
+          <a:xfrm>
+            <a:off x="5136019" y="695251"/>
+            <a:ext cx="1919956" cy="1913557"/>
+          </a:xfrm>
+          <a:prstGeom prst="rect">
+            <a:avLst/>
+          </a:prstGeom>
+          <a:noFill/>
+          <a:extLst>
+            <a:ext uri="{909E8E84-426E-40DD-AFC4-6F175D3DCCD1}">
+              <a14:hiddenFill xmlns:a14="http://schemas.microsoft.com/office/drawing/2010/main">
+                <a:solidFill>
+                  <a:srgbClr val="FFFFFF"/>
+                </a:solidFill>
+              </a14:hiddenFill>
+            </a:ext>
+          </a:extLst>
+        </p:spPr>
+      </p:pic>
+      <p:sp>
+        <p:nvSpPr>
+          <p:cNvPr id="27" name="TextBox 26">
+            <a:extLst>
+              <a:ext uri="{FF2B5EF4-FFF2-40B4-BE49-F238E27FC236}">
+                <a16:creationId xmlns:a16="http://schemas.microsoft.com/office/drawing/2014/main" id="{DFB88911-651E-2FD9-3D6F-F78A067FC3A4}"/>
+              </a:ext>
+            </a:extLst>
+          </p:cNvPr>
+          <p:cNvSpPr txBox="1"/>
+          <p:nvPr/>
+        </p:nvSpPr>
+        <p:spPr>
+          <a:xfrm>
+            <a:off x="2876351" y="3114741"/>
+            <a:ext cx="1616083" cy="430887"/>
+          </a:xfrm>
+          <a:prstGeom prst="rect">
+            <a:avLst/>
+          </a:prstGeom>
+          <a:noFill/>
+        </p:spPr>
+        <p:txBody>
+          <a:bodyPr wrap="none" rtlCol="0">
+            <a:spAutoFit/>
+          </a:bodyPr>
+          <a:lstStyle/>
+          <a:p>
+            <a:r>
+              <a:rPr lang="en-US" sz="2200" dirty="0">
+                <a:solidFill>
+                  <a:schemeClr val="bg1"/>
+                </a:solidFill>
+              </a:rPr>
+              <a:t>\\ID\LG9158</a:t>
+            </a:r>
+            <a:endParaRPr lang="sv-SE" sz="2200" dirty="0">
+              <a:solidFill>
+                <a:schemeClr val="bg1"/>
+              </a:solidFill>
+            </a:endParaRPr>
+          </a:p>
+        </p:txBody>
+      </p:sp>
+      <p:sp>
+        <p:nvSpPr>
+          <p:cNvPr id="2" name="TextBox 1">
+            <a:extLst>
+              <a:ext uri="{FF2B5EF4-FFF2-40B4-BE49-F238E27FC236}">
+                <a16:creationId xmlns:a16="http://schemas.microsoft.com/office/drawing/2014/main" id="{D171AF14-B957-940D-9B9E-11004CF5EB94}"/>
+              </a:ext>
+            </a:extLst>
+          </p:cNvPr>
+          <p:cNvSpPr txBox="1"/>
+          <p:nvPr/>
+        </p:nvSpPr>
+        <p:spPr>
+          <a:xfrm>
+            <a:off x="2423324" y="3114741"/>
+            <a:ext cx="7345344" cy="430887"/>
+          </a:xfrm>
+          <a:prstGeom prst="rect">
+            <a:avLst/>
+          </a:prstGeom>
+          <a:noFill/>
+        </p:spPr>
+        <p:txBody>
+          <a:bodyPr wrap="square" rtlCol="0">
+            <a:spAutoFit/>
+          </a:bodyPr>
+          <a:lstStyle/>
+          <a:p>
+            <a:r>
+              <a:rPr lang="en-US" sz="2200" dirty="0">
+                <a:solidFill>
+                  <a:schemeClr val="bg1"/>
+                </a:solidFill>
+              </a:rPr>
+              <a:t>DISPLAY\LG9158\5&amp;amp;XXXXXXXX&amp;amp;0&amp;amp;UIDXXXXX_0</a:t>
+            </a:r>
+            <a:endParaRPr lang="sv-SE" sz="2200" dirty="0">
+              <a:solidFill>
+                <a:schemeClr val="bg1"/>
+              </a:solidFill>
+            </a:endParaRPr>
+          </a:p>
+        </p:txBody>
+      </p:sp>
+      <p:sp>
+        <p:nvSpPr>
+          <p:cNvPr id="6" name="TextBox 5">
+            <a:extLst>
+              <a:ext uri="{FF2B5EF4-FFF2-40B4-BE49-F238E27FC236}">
+                <a16:creationId xmlns:a16="http://schemas.microsoft.com/office/drawing/2014/main" id="{BD51AAF4-41FF-7E02-7FE7-BB8CF531D1C8}"/>
+              </a:ext>
+            </a:extLst>
+          </p:cNvPr>
+          <p:cNvSpPr txBox="1"/>
+          <p:nvPr/>
+        </p:nvSpPr>
+        <p:spPr>
+          <a:xfrm>
+            <a:off x="2423323" y="3545628"/>
+            <a:ext cx="7842895" cy="430887"/>
+          </a:xfrm>
+          <a:prstGeom prst="rect">
+            <a:avLst/>
+          </a:prstGeom>
+          <a:noFill/>
+        </p:spPr>
+        <p:txBody>
+          <a:bodyPr wrap="square" rtlCol="0">
+            <a:spAutoFit/>
+          </a:bodyPr>
+          <a:lstStyle/>
+          <a:p>
+            <a:r>
+              <a:rPr lang="en-US" sz="2200" dirty="0">
+                <a:solidFill>
+                  <a:schemeClr val="tx1">
+                    <a:lumMod val="65000"/>
+                    <a:lumOff val="35000"/>
+                  </a:schemeClr>
+                </a:solidFill>
+              </a:rPr>
+              <a:t>DISPLAY\SMG9158\5&amp;amp;XXXXXXXX&amp;amp;0&amp;amp;UIDXXXXX_0</a:t>
+            </a:r>
+            <a:endParaRPr lang="sv-SE" sz="2200" dirty="0">
+              <a:solidFill>
+                <a:schemeClr val="tx1">
+                  <a:lumMod val="65000"/>
+                  <a:lumOff val="35000"/>
+                </a:schemeClr>
+              </a:solidFill>
+            </a:endParaRPr>
+          </a:p>
+        </p:txBody>
+      </p:sp>
+      <p:sp>
+        <p:nvSpPr>
+          <p:cNvPr id="7" name="TextBox 6">
+            <a:extLst>
+              <a:ext uri="{FF2B5EF4-FFF2-40B4-BE49-F238E27FC236}">
+                <a16:creationId xmlns:a16="http://schemas.microsoft.com/office/drawing/2014/main" id="{2AAD290B-1148-1EDB-F70C-6B313F7E6E43}"/>
+              </a:ext>
+            </a:extLst>
+          </p:cNvPr>
+          <p:cNvSpPr txBox="1"/>
+          <p:nvPr/>
+        </p:nvSpPr>
+        <p:spPr>
+          <a:xfrm>
+            <a:off x="2423323" y="3960135"/>
+            <a:ext cx="8009149" cy="430887"/>
+          </a:xfrm>
+          <a:prstGeom prst="rect">
+            <a:avLst/>
+          </a:prstGeom>
+          <a:noFill/>
+        </p:spPr>
+        <p:txBody>
+          <a:bodyPr wrap="square" rtlCol="0">
+            <a:spAutoFit/>
+          </a:bodyPr>
+          <a:lstStyle/>
+          <a:p>
+            <a:r>
+              <a:rPr lang="en-US" sz="2200" dirty="0">
+                <a:solidFill>
+                  <a:schemeClr val="tx1">
+                    <a:lumMod val="65000"/>
+                    <a:lumOff val="35000"/>
+                  </a:schemeClr>
+                </a:solidFill>
+              </a:rPr>
+              <a:t>DISPLAY\AOC7205\5&amp;amp;XXXXXXXX&amp;amp;0&amp;amp;UIDXXXXX_0</a:t>
+            </a:r>
+            <a:endParaRPr lang="sv-SE" sz="2200" dirty="0">
+              <a:solidFill>
+                <a:schemeClr val="tx1">
+                  <a:lumMod val="65000"/>
+                  <a:lumOff val="35000"/>
+                </a:schemeClr>
+              </a:solidFill>
+            </a:endParaRPr>
+          </a:p>
+        </p:txBody>
+      </p:sp>
+      <p:sp>
+        <p:nvSpPr>
+          <p:cNvPr id="8" name="TextBox 7">
+            <a:extLst>
+              <a:ext uri="{FF2B5EF4-FFF2-40B4-BE49-F238E27FC236}">
+                <a16:creationId xmlns:a16="http://schemas.microsoft.com/office/drawing/2014/main" id="{F3E7B99D-FF1E-4B58-2F55-2CA69C5695D0}"/>
+              </a:ext>
+            </a:extLst>
+          </p:cNvPr>
+          <p:cNvSpPr txBox="1"/>
+          <p:nvPr/>
+        </p:nvSpPr>
+        <p:spPr>
+          <a:xfrm>
+            <a:off x="2702278" y="4933264"/>
+            <a:ext cx="6787436" cy="369332"/>
+          </a:xfrm>
+          <a:prstGeom prst="rect">
+            <a:avLst/>
+          </a:prstGeom>
+          <a:noFill/>
+        </p:spPr>
+        <p:txBody>
+          <a:bodyPr wrap="none" rtlCol="0">
+            <a:spAutoFit/>
+          </a:bodyPr>
+          <a:lstStyle/>
+          <a:p>
+            <a:r>
+              <a:rPr lang="sv-SE" dirty="0">
+                <a:solidFill>
+                  <a:schemeClr val="bg1"/>
+                </a:solidFill>
+              </a:rPr>
+              <a:t>Must Monitor be the only enabled screen in order to trigger reaction?:</a:t>
+            </a:r>
+          </a:p>
+        </p:txBody>
+      </p:sp>
+      <p:sp>
+        <p:nvSpPr>
+          <p:cNvPr id="20" name="Oval 19">
+            <a:extLst>
+              <a:ext uri="{FF2B5EF4-FFF2-40B4-BE49-F238E27FC236}">
+                <a16:creationId xmlns:a16="http://schemas.microsoft.com/office/drawing/2014/main" id="{569FDC5F-5980-A875-6E89-0F3CFF8AF2B7}"/>
+              </a:ext>
+            </a:extLst>
+          </p:cNvPr>
+          <p:cNvSpPr/>
+          <p:nvPr/>
+        </p:nvSpPr>
+        <p:spPr>
+          <a:xfrm>
+            <a:off x="4074489" y="5515815"/>
+            <a:ext cx="835890" cy="835890"/>
+          </a:xfrm>
+          <a:prstGeom prst="ellipse">
+            <a:avLst/>
+          </a:prstGeom>
+          <a:solidFill>
+            <a:schemeClr val="tx1"/>
+          </a:solidFill>
+          <a:ln>
+            <a:solidFill>
+              <a:srgbClr val="70AD47"/>
+            </a:solidFill>
+          </a:ln>
+        </p:spPr>
+        <p:style>
+          <a:lnRef idx="2">
+            <a:schemeClr val="accent1">
+              <a:shade val="50000"/>
+            </a:schemeClr>
+          </a:lnRef>
+          <a:fillRef idx="1">
+            <a:schemeClr val="accent1"/>
+          </a:fillRef>
+          <a:effectRef idx="0">
+            <a:schemeClr val="accent1"/>
+          </a:effectRef>
+          <a:fontRef idx="minor">
+            <a:schemeClr val="lt1"/>
+          </a:fontRef>
+        </p:style>
+        <p:txBody>
+          <a:bodyPr rtlCol="0" anchor="ctr"/>
+          <a:lstStyle/>
+          <a:p>
+            <a:pPr algn="ctr"/>
+            <a:endParaRPr lang="sv-SE"/>
+          </a:p>
+        </p:txBody>
+      </p:sp>
+      <p:sp>
+        <p:nvSpPr>
+          <p:cNvPr id="12" name="TextBox 11">
+            <a:extLst>
+              <a:ext uri="{FF2B5EF4-FFF2-40B4-BE49-F238E27FC236}">
+                <a16:creationId xmlns:a16="http://schemas.microsoft.com/office/drawing/2014/main" id="{03CAC4CB-9F78-08FC-8A9C-31C4F84D9C32}"/>
+              </a:ext>
+            </a:extLst>
+          </p:cNvPr>
+          <p:cNvSpPr txBox="1"/>
+          <p:nvPr/>
+        </p:nvSpPr>
+        <p:spPr>
+          <a:xfrm>
+            <a:off x="4111881" y="5695233"/>
+            <a:ext cx="761106" cy="477054"/>
+          </a:xfrm>
+          <a:prstGeom prst="rect">
+            <a:avLst/>
+          </a:prstGeom>
+          <a:noFill/>
+        </p:spPr>
+        <p:txBody>
+          <a:bodyPr wrap="none" rtlCol="0">
+            <a:spAutoFit/>
+          </a:bodyPr>
+          <a:lstStyle/>
+          <a:p>
+            <a:r>
+              <a:rPr lang="sv-SE" sz="2500" dirty="0">
+                <a:solidFill>
+                  <a:schemeClr val="accent6"/>
+                </a:solidFill>
+              </a:rPr>
+              <a:t>True</a:t>
+            </a:r>
+          </a:p>
+        </p:txBody>
+      </p:sp>
+      <p:sp>
+        <p:nvSpPr>
+          <p:cNvPr id="21" name="Oval 20">
+            <a:extLst>
+              <a:ext uri="{FF2B5EF4-FFF2-40B4-BE49-F238E27FC236}">
+                <a16:creationId xmlns:a16="http://schemas.microsoft.com/office/drawing/2014/main" id="{561CE001-5D64-5388-1D1D-4791B1097205}"/>
+              </a:ext>
+            </a:extLst>
+          </p:cNvPr>
+          <p:cNvSpPr/>
+          <p:nvPr/>
+        </p:nvSpPr>
+        <p:spPr>
+          <a:xfrm>
+            <a:off x="7367962" y="5489497"/>
+            <a:ext cx="835890" cy="835890"/>
+          </a:xfrm>
+          <a:prstGeom prst="ellipse">
+            <a:avLst/>
+          </a:prstGeom>
+          <a:solidFill>
+            <a:schemeClr val="tx1"/>
+          </a:solidFill>
+          <a:ln>
+            <a:solidFill>
+              <a:srgbClr val="FF0000"/>
+            </a:solidFill>
+          </a:ln>
+        </p:spPr>
+        <p:style>
+          <a:lnRef idx="2">
+            <a:schemeClr val="accent1">
+              <a:shade val="50000"/>
+            </a:schemeClr>
+          </a:lnRef>
+          <a:fillRef idx="1">
+            <a:schemeClr val="accent1"/>
+          </a:fillRef>
+          <a:effectRef idx="0">
+            <a:schemeClr val="accent1"/>
+          </a:effectRef>
+          <a:fontRef idx="minor">
+            <a:schemeClr val="lt1"/>
+          </a:fontRef>
+        </p:style>
+        <p:txBody>
+          <a:bodyPr rtlCol="0" anchor="ctr"/>
+          <a:lstStyle/>
+          <a:p>
+            <a:pPr algn="ctr"/>
+            <a:endParaRPr lang="sv-SE"/>
+          </a:p>
+        </p:txBody>
+      </p:sp>
+      <p:sp>
+        <p:nvSpPr>
+          <p:cNvPr id="14" name="TextBox 13">
+            <a:extLst>
+              <a:ext uri="{FF2B5EF4-FFF2-40B4-BE49-F238E27FC236}">
+                <a16:creationId xmlns:a16="http://schemas.microsoft.com/office/drawing/2014/main" id="{6C2A2586-0913-4A68-2744-B56D4B25AAAD}"/>
+              </a:ext>
+            </a:extLst>
+          </p:cNvPr>
+          <p:cNvSpPr txBox="1"/>
+          <p:nvPr/>
+        </p:nvSpPr>
+        <p:spPr>
+          <a:xfrm>
+            <a:off x="7384922" y="5668915"/>
+            <a:ext cx="836511" cy="477054"/>
+          </a:xfrm>
+          <a:prstGeom prst="rect">
+            <a:avLst/>
+          </a:prstGeom>
+          <a:noFill/>
+        </p:spPr>
+        <p:txBody>
+          <a:bodyPr wrap="none" rtlCol="0">
+            <a:spAutoFit/>
+          </a:bodyPr>
+          <a:lstStyle/>
+          <a:p>
+            <a:r>
+              <a:rPr lang="sv-SE" sz="2500" dirty="0">
+                <a:solidFill>
+                  <a:srgbClr val="FF0000"/>
+                </a:solidFill>
+              </a:rPr>
+              <a:t>False</a:t>
+            </a:r>
+          </a:p>
+        </p:txBody>
+      </p:sp>
     </p:spTree>
     <p:extLst>
       <p:ext uri="{BB962C8B-B14F-4D97-AF65-F5344CB8AC3E}">
-        <p14:creationId xmlns:p14="http://schemas.microsoft.com/office/powerpoint/2010/main" val="2133402676"/>
+        <p14:creationId xmlns:p14="http://schemas.microsoft.com/office/powerpoint/2010/main" val="94492322"/>
       </p:ext>
     </p:extLst>
   </p:cSld>
   <p:clrMapOvr>
     <a:masterClrMapping/>
   </p:clrMapOvr>
+  <mc:AlternateContent xmlns:mc="http://schemas.openxmlformats.org/markup-compatibility/2006">
+    <mc:Choice xmlns:p159="http://schemas.microsoft.com/office/powerpoint/2015/09/main" Requires="p159">
+      <p:transition xmlns:p14="http://schemas.microsoft.com/office/powerpoint/2010/main" spd="slow" p14:dur="2000">
+        <p159:morph option="byObject"/>
+      </p:transition>
+    </mc:Choice>
+    <mc:Fallback>
+      <p:transition spd="slow">
+        <p:fade/>
+      </p:transition>
+    </mc:Fallback>
+  </mc:AlternateContent>
+  <p:timing>
+    <p:tnLst>
+      <p:par>
+        <p:cTn id="1" dur="indefinite" restart="never" nodeType="tmRoot">
+          <p:childTnLst>
+            <p:seq concurrent="1" nextAc="seek">
+              <p:cTn id="2" dur="indefinite" nodeType="mainSeq">
+                <p:childTnLst>
+                  <p:par>
+                    <p:cTn id="3" fill="hold">
+                      <p:stCondLst>
+                        <p:cond delay="indefinite"/>
+                        <p:cond evt="onBegin" delay="0">
+                          <p:tn val="2"/>
+                        </p:cond>
+                      </p:stCondLst>
+                      <p:childTnLst>
+                        <p:par>
+                          <p:cTn id="4" fill="hold">
+                            <p:stCondLst>
+                              <p:cond delay="0"/>
+                            </p:stCondLst>
+                            <p:childTnLst>
+                              <p:par>
+                                <p:cTn id="5" presetID="10" presetClass="exit" presetSubtype="0" fill="hold" grpId="0" nodeType="afterEffect">
+                                  <p:stCondLst>
+                                    <p:cond delay="0"/>
+                                  </p:stCondLst>
+                                  <p:childTnLst>
+                                    <p:animEffect transition="out" filter="fade">
+                                      <p:cBhvr>
+                                        <p:cTn id="6" dur="500"/>
+                                        <p:tgtEl>
+                                          <p:spTgt spid="27"/>
+                                        </p:tgtEl>
+                                      </p:cBhvr>
+                                    </p:animEffect>
+                                    <p:set>
+                                      <p:cBhvr>
+                                        <p:cTn id="7" dur="1" fill="hold">
+                                          <p:stCondLst>
+                                            <p:cond delay="499"/>
+                                          </p:stCondLst>
+                                        </p:cTn>
+                                        <p:tgtEl>
+                                          <p:spTgt spid="27"/>
+                                        </p:tgtEl>
+                                        <p:attrNameLst>
+                                          <p:attrName>style.visibility</p:attrName>
+                                        </p:attrNameLst>
+                                      </p:cBhvr>
+                                      <p:to>
+                                        <p:strVal val="hidden"/>
+                                      </p:to>
+                                    </p:set>
+                                  </p:childTnLst>
+                                </p:cTn>
+                              </p:par>
+                              <p:par>
+                                <p:cTn id="8" presetID="10" presetClass="entr" presetSubtype="0" fill="hold" nodeType="withEffect">
+                                  <p:stCondLst>
+                                    <p:cond delay="200"/>
+                                  </p:stCondLst>
+                                  <p:childTnLst>
+                                    <p:set>
+                                      <p:cBhvr>
+                                        <p:cTn id="9" dur="1" fill="hold">
+                                          <p:stCondLst>
+                                            <p:cond delay="0"/>
+                                          </p:stCondLst>
+                                        </p:cTn>
+                                        <p:tgtEl>
+                                          <p:spTgt spid="2">
+                                            <p:txEl>
+                                              <p:pRg st="0" end="0"/>
+                                            </p:txEl>
+                                          </p:spTgt>
+                                        </p:tgtEl>
+                                        <p:attrNameLst>
+                                          <p:attrName>style.visibility</p:attrName>
+                                        </p:attrNameLst>
+                                      </p:cBhvr>
+                                      <p:to>
+                                        <p:strVal val="visible"/>
+                                      </p:to>
+                                    </p:set>
+                                    <p:animEffect transition="in" filter="fade">
+                                      <p:cBhvr>
+                                        <p:cTn id="10" dur="500"/>
+                                        <p:tgtEl>
+                                          <p:spTgt spid="2">
+                                            <p:txEl>
+                                              <p:pRg st="0" end="0"/>
+                                            </p:txEl>
+                                          </p:spTgt>
+                                        </p:tgtEl>
+                                      </p:cBhvr>
+                                    </p:animEffect>
+                                  </p:childTnLst>
+                                </p:cTn>
+                              </p:par>
+                            </p:childTnLst>
+                          </p:cTn>
+                        </p:par>
+                      </p:childTnLst>
+                    </p:cTn>
+                  </p:par>
+                  <p:par>
+                    <p:cTn id="11" fill="hold">
+                      <p:stCondLst>
+                        <p:cond delay="indefinite"/>
+                      </p:stCondLst>
+                      <p:childTnLst>
+                        <p:par>
+                          <p:cTn id="12" fill="hold">
+                            <p:stCondLst>
+                              <p:cond delay="0"/>
+                            </p:stCondLst>
+                            <p:childTnLst>
+                              <p:par>
+                                <p:cTn id="13" presetID="10" presetClass="entr" presetSubtype="0" fill="hold" nodeType="clickEffect">
+                                  <p:stCondLst>
+                                    <p:cond delay="0"/>
+                                  </p:stCondLst>
+                                  <p:childTnLst>
+                                    <p:set>
+                                      <p:cBhvr>
+                                        <p:cTn id="14" dur="1" fill="hold">
+                                          <p:stCondLst>
+                                            <p:cond delay="0"/>
+                                          </p:stCondLst>
+                                        </p:cTn>
+                                        <p:tgtEl>
+                                          <p:spTgt spid="6">
+                                            <p:txEl>
+                                              <p:pRg st="0" end="0"/>
+                                            </p:txEl>
+                                          </p:spTgt>
+                                        </p:tgtEl>
+                                        <p:attrNameLst>
+                                          <p:attrName>style.visibility</p:attrName>
+                                        </p:attrNameLst>
+                                      </p:cBhvr>
+                                      <p:to>
+                                        <p:strVal val="visible"/>
+                                      </p:to>
+                                    </p:set>
+                                    <p:animEffect transition="in" filter="fade">
+                                      <p:cBhvr>
+                                        <p:cTn id="15" dur="500"/>
+                                        <p:tgtEl>
+                                          <p:spTgt spid="6">
+                                            <p:txEl>
+                                              <p:pRg st="0" end="0"/>
+                                            </p:txEl>
+                                          </p:spTgt>
+                                        </p:tgtEl>
+                                      </p:cBhvr>
+                                    </p:animEffect>
+                                  </p:childTnLst>
+                                </p:cTn>
+                              </p:par>
+                              <p:par>
+                                <p:cTn id="16" presetID="10" presetClass="entr" presetSubtype="0" fill="hold" nodeType="withEffect">
+                                  <p:stCondLst>
+                                    <p:cond delay="200"/>
+                                  </p:stCondLst>
+                                  <p:childTnLst>
+                                    <p:set>
+                                      <p:cBhvr>
+                                        <p:cTn id="17" dur="1" fill="hold">
+                                          <p:stCondLst>
+                                            <p:cond delay="0"/>
+                                          </p:stCondLst>
+                                        </p:cTn>
+                                        <p:tgtEl>
+                                          <p:spTgt spid="7">
+                                            <p:txEl>
+                                              <p:pRg st="0" end="0"/>
+                                            </p:txEl>
+                                          </p:spTgt>
+                                        </p:tgtEl>
+                                        <p:attrNameLst>
+                                          <p:attrName>style.visibility</p:attrName>
+                                        </p:attrNameLst>
+                                      </p:cBhvr>
+                                      <p:to>
+                                        <p:strVal val="visible"/>
+                                      </p:to>
+                                    </p:set>
+                                    <p:animEffect transition="in" filter="fade">
+                                      <p:cBhvr>
+                                        <p:cTn id="18" dur="500"/>
+                                        <p:tgtEl>
+                                          <p:spTgt spid="7">
+                                            <p:txEl>
+                                              <p:pRg st="0" end="0"/>
+                                            </p:txEl>
+                                          </p:spTgt>
+                                        </p:tgtEl>
+                                      </p:cBhvr>
+                                    </p:animEffect>
+                                  </p:childTnLst>
+                                </p:cTn>
+                              </p:par>
+                            </p:childTnLst>
+                          </p:cTn>
+                        </p:par>
+                      </p:childTnLst>
+                    </p:cTn>
+                  </p:par>
+                  <p:par>
+                    <p:cTn id="19" fill="hold">
+                      <p:stCondLst>
+                        <p:cond delay="indefinite"/>
+                      </p:stCondLst>
+                      <p:childTnLst>
+                        <p:par>
+                          <p:cTn id="20" fill="hold">
+                            <p:stCondLst>
+                              <p:cond delay="0"/>
+                            </p:stCondLst>
+                            <p:childTnLst>
+                              <p:par>
+                                <p:cTn id="21" presetID="10" presetClass="entr" presetSubtype="0" fill="hold" grpId="0" nodeType="clickEffect">
+                                  <p:stCondLst>
+                                    <p:cond delay="0"/>
+                                  </p:stCondLst>
+                                  <p:childTnLst>
+                                    <p:set>
+                                      <p:cBhvr>
+                                        <p:cTn id="22" dur="1" fill="hold">
+                                          <p:stCondLst>
+                                            <p:cond delay="0"/>
+                                          </p:stCondLst>
+                                        </p:cTn>
+                                        <p:tgtEl>
+                                          <p:spTgt spid="8"/>
+                                        </p:tgtEl>
+                                        <p:attrNameLst>
+                                          <p:attrName>style.visibility</p:attrName>
+                                        </p:attrNameLst>
+                                      </p:cBhvr>
+                                      <p:to>
+                                        <p:strVal val="visible"/>
+                                      </p:to>
+                                    </p:set>
+                                    <p:animEffect transition="in" filter="fade">
+                                      <p:cBhvr>
+                                        <p:cTn id="23" dur="500"/>
+                                        <p:tgtEl>
+                                          <p:spTgt spid="8"/>
+                                        </p:tgtEl>
+                                      </p:cBhvr>
+                                    </p:animEffect>
+                                  </p:childTnLst>
+                                </p:cTn>
+                              </p:par>
+                            </p:childTnLst>
+                          </p:cTn>
+                        </p:par>
+                        <p:par>
+                          <p:cTn id="24" fill="hold">
+                            <p:stCondLst>
+                              <p:cond delay="500"/>
+                            </p:stCondLst>
+                            <p:childTnLst>
+                              <p:par>
+                                <p:cTn id="25" presetID="10" presetClass="entr" presetSubtype="0" fill="hold" grpId="0" nodeType="afterEffect">
+                                  <p:stCondLst>
+                                    <p:cond delay="0"/>
+                                  </p:stCondLst>
+                                  <p:childTnLst>
+                                    <p:set>
+                                      <p:cBhvr>
+                                        <p:cTn id="26" dur="1" fill="hold">
+                                          <p:stCondLst>
+                                            <p:cond delay="0"/>
+                                          </p:stCondLst>
+                                        </p:cTn>
+                                        <p:tgtEl>
+                                          <p:spTgt spid="12">
+                                            <p:txEl>
+                                              <p:pRg st="0" end="0"/>
+                                            </p:txEl>
+                                          </p:spTgt>
+                                        </p:tgtEl>
+                                        <p:attrNameLst>
+                                          <p:attrName>style.visibility</p:attrName>
+                                        </p:attrNameLst>
+                                      </p:cBhvr>
+                                      <p:to>
+                                        <p:strVal val="visible"/>
+                                      </p:to>
+                                    </p:set>
+                                    <p:animEffect transition="in" filter="fade">
+                                      <p:cBhvr>
+                                        <p:cTn id="27" dur="500"/>
+                                        <p:tgtEl>
+                                          <p:spTgt spid="12">
+                                            <p:txEl>
+                                              <p:pRg st="0" end="0"/>
+                                            </p:txEl>
+                                          </p:spTgt>
+                                        </p:tgtEl>
+                                      </p:cBhvr>
+                                    </p:animEffect>
+                                  </p:childTnLst>
+                                </p:cTn>
+                              </p:par>
+                              <p:par>
+                                <p:cTn id="28" presetID="10" presetClass="entr" presetSubtype="0" fill="hold" grpId="0" nodeType="withEffect">
+                                  <p:stCondLst>
+                                    <p:cond delay="0"/>
+                                  </p:stCondLst>
+                                  <p:childTnLst>
+                                    <p:set>
+                                      <p:cBhvr>
+                                        <p:cTn id="29" dur="1" fill="hold">
+                                          <p:stCondLst>
+                                            <p:cond delay="0"/>
+                                          </p:stCondLst>
+                                        </p:cTn>
+                                        <p:tgtEl>
+                                          <p:spTgt spid="20"/>
+                                        </p:tgtEl>
+                                        <p:attrNameLst>
+                                          <p:attrName>style.visibility</p:attrName>
+                                        </p:attrNameLst>
+                                      </p:cBhvr>
+                                      <p:to>
+                                        <p:strVal val="visible"/>
+                                      </p:to>
+                                    </p:set>
+                                    <p:animEffect transition="in" filter="fade">
+                                      <p:cBhvr>
+                                        <p:cTn id="30" dur="500"/>
+                                        <p:tgtEl>
+                                          <p:spTgt spid="20"/>
+                                        </p:tgtEl>
+                                      </p:cBhvr>
+                                    </p:animEffect>
+                                  </p:childTnLst>
+                                </p:cTn>
+                              </p:par>
+                              <p:par>
+                                <p:cTn id="31" presetID="10" presetClass="entr" presetSubtype="0" fill="hold" grpId="0" nodeType="withEffect">
+                                  <p:stCondLst>
+                                    <p:cond delay="0"/>
+                                  </p:stCondLst>
+                                  <p:childTnLst>
+                                    <p:set>
+                                      <p:cBhvr>
+                                        <p:cTn id="32" dur="1" fill="hold">
+                                          <p:stCondLst>
+                                            <p:cond delay="0"/>
+                                          </p:stCondLst>
+                                        </p:cTn>
+                                        <p:tgtEl>
+                                          <p:spTgt spid="14">
+                                            <p:txEl>
+                                              <p:pRg st="0" end="0"/>
+                                            </p:txEl>
+                                          </p:spTgt>
+                                        </p:tgtEl>
+                                        <p:attrNameLst>
+                                          <p:attrName>style.visibility</p:attrName>
+                                        </p:attrNameLst>
+                                      </p:cBhvr>
+                                      <p:to>
+                                        <p:strVal val="visible"/>
+                                      </p:to>
+                                    </p:set>
+                                    <p:animEffect transition="in" filter="fade">
+                                      <p:cBhvr>
+                                        <p:cTn id="33" dur="500"/>
+                                        <p:tgtEl>
+                                          <p:spTgt spid="14">
+                                            <p:txEl>
+                                              <p:pRg st="0" end="0"/>
+                                            </p:txEl>
+                                          </p:spTgt>
+                                        </p:tgtEl>
+                                      </p:cBhvr>
+                                    </p:animEffect>
+                                  </p:childTnLst>
+                                </p:cTn>
+                              </p:par>
+                              <p:par>
+                                <p:cTn id="34" presetID="10" presetClass="entr" presetSubtype="0" fill="hold" grpId="1" nodeType="withEffect">
+                                  <p:stCondLst>
+                                    <p:cond delay="0"/>
+                                  </p:stCondLst>
+                                  <p:childTnLst>
+                                    <p:set>
+                                      <p:cBhvr>
+                                        <p:cTn id="35" dur="1" fill="hold">
+                                          <p:stCondLst>
+                                            <p:cond delay="0"/>
+                                          </p:stCondLst>
+                                        </p:cTn>
+                                        <p:tgtEl>
+                                          <p:spTgt spid="21"/>
+                                        </p:tgtEl>
+                                        <p:attrNameLst>
+                                          <p:attrName>style.visibility</p:attrName>
+                                        </p:attrNameLst>
+                                      </p:cBhvr>
+                                      <p:to>
+                                        <p:strVal val="visible"/>
+                                      </p:to>
+                                    </p:set>
+                                    <p:animEffect transition="in" filter="fade">
+                                      <p:cBhvr>
+                                        <p:cTn id="36" dur="500"/>
+                                        <p:tgtEl>
+                                          <p:spTgt spid="21"/>
+                                        </p:tgtEl>
+                                      </p:cBhvr>
+                                    </p:animEffect>
+                                  </p:childTnLst>
+                                </p:cTn>
+                              </p:par>
+                            </p:childTnLst>
+                          </p:cTn>
+                        </p:par>
+                      </p:childTnLst>
+                    </p:cTn>
+                  </p:par>
+                  <p:par>
+                    <p:cTn id="37" fill="hold">
+                      <p:stCondLst>
+                        <p:cond delay="indefinite"/>
+                      </p:stCondLst>
+                      <p:childTnLst>
+                        <p:par>
+                          <p:cTn id="38" fill="hold">
+                            <p:stCondLst>
+                              <p:cond delay="0"/>
+                            </p:stCondLst>
+                            <p:childTnLst>
+                              <p:par>
+                                <p:cTn id="39" presetID="19" presetClass="emph" presetSubtype="0" fill="hold" nodeType="clickEffect">
+                                  <p:stCondLst>
+                                    <p:cond delay="0"/>
+                                  </p:stCondLst>
+                                  <p:childTnLst>
+                                    <p:animClr clrSpc="rgb" dir="cw">
+                                      <p:cBhvr override="childStyle">
+                                        <p:cTn id="40" dur="500" fill="hold"/>
+                                        <p:tgtEl>
+                                          <p:spTgt spid="12">
+                                            <p:txEl>
+                                              <p:pRg st="0" end="0"/>
+                                            </p:txEl>
+                                          </p:spTgt>
+                                        </p:tgtEl>
+                                        <p:attrNameLst>
+                                          <p:attrName>style.color</p:attrName>
+                                        </p:attrNameLst>
+                                      </p:cBhvr>
+                                      <p:to>
+                                        <a:schemeClr val="bg1"/>
+                                      </p:to>
+                                    </p:animClr>
+                                    <p:animClr clrSpc="rgb" dir="cw">
+                                      <p:cBhvr>
+                                        <p:cTn id="41" dur="500" fill="hold"/>
+                                        <p:tgtEl>
+                                          <p:spTgt spid="12">
+                                            <p:txEl>
+                                              <p:pRg st="0" end="0"/>
+                                            </p:txEl>
+                                          </p:spTgt>
+                                        </p:tgtEl>
+                                        <p:attrNameLst>
+                                          <p:attrName>fillcolor</p:attrName>
+                                        </p:attrNameLst>
+                                      </p:cBhvr>
+                                      <p:to>
+                                        <a:schemeClr val="bg1"/>
+                                      </p:to>
+                                    </p:animClr>
+                                    <p:set>
+                                      <p:cBhvr>
+                                        <p:cTn id="42" dur="500" fill="hold"/>
+                                        <p:tgtEl>
+                                          <p:spTgt spid="12">
+                                            <p:txEl>
+                                              <p:pRg st="0" end="0"/>
+                                            </p:txEl>
+                                          </p:spTgt>
+                                        </p:tgtEl>
+                                        <p:attrNameLst>
+                                          <p:attrName>fill.type</p:attrName>
+                                        </p:attrNameLst>
+                                      </p:cBhvr>
+                                      <p:to>
+                                        <p:strVal val="solid"/>
+                                      </p:to>
+                                    </p:set>
+                                    <p:set>
+                                      <p:cBhvr>
+                                        <p:cTn id="43" dur="500" fill="hold"/>
+                                        <p:tgtEl>
+                                          <p:spTgt spid="12">
+                                            <p:txEl>
+                                              <p:pRg st="0" end="0"/>
+                                            </p:txEl>
+                                          </p:spTgt>
+                                        </p:tgtEl>
+                                        <p:attrNameLst>
+                                          <p:attrName>fill.on</p:attrName>
+                                        </p:attrNameLst>
+                                      </p:cBhvr>
+                                      <p:to>
+                                        <p:strVal val="true"/>
+                                      </p:to>
+                                    </p:set>
+                                  </p:childTnLst>
+                                </p:cTn>
+                              </p:par>
+                              <p:par>
+                                <p:cTn id="44" presetID="1" presetClass="emph" presetSubtype="2" fill="hold" nodeType="withEffect">
+                                  <p:stCondLst>
+                                    <p:cond delay="0"/>
+                                  </p:stCondLst>
+                                  <p:childTnLst>
+                                    <p:animClr clrSpc="rgb" dir="cw">
+                                      <p:cBhvr>
+                                        <p:cTn id="45" dur="500" fill="hold"/>
+                                        <p:tgtEl>
+                                          <p:spTgt spid="20"/>
+                                        </p:tgtEl>
+                                        <p:attrNameLst>
+                                          <p:attrName>fillcolor</p:attrName>
+                                        </p:attrNameLst>
+                                      </p:cBhvr>
+                                      <p:to>
+                                        <a:srgbClr val="70AD47"/>
+                                      </p:to>
+                                    </p:animClr>
+                                    <p:set>
+                                      <p:cBhvr>
+                                        <p:cTn id="46" dur="500" fill="hold"/>
+                                        <p:tgtEl>
+                                          <p:spTgt spid="20"/>
+                                        </p:tgtEl>
+                                        <p:attrNameLst>
+                                          <p:attrName>fill.type</p:attrName>
+                                        </p:attrNameLst>
+                                      </p:cBhvr>
+                                      <p:to>
+                                        <p:strVal val="solid"/>
+                                      </p:to>
+                                    </p:set>
+                                    <p:set>
+                                      <p:cBhvr>
+                                        <p:cTn id="47" dur="500" fill="hold"/>
+                                        <p:tgtEl>
+                                          <p:spTgt spid="20"/>
+                                        </p:tgtEl>
+                                        <p:attrNameLst>
+                                          <p:attrName>fill.on</p:attrName>
+                                        </p:attrNameLst>
+                                      </p:cBhvr>
+                                      <p:to>
+                                        <p:strVal val="true"/>
+                                      </p:to>
+                                    </p:set>
+                                  </p:childTnLst>
+                                </p:cTn>
+                              </p:par>
+                            </p:childTnLst>
+                          </p:cTn>
+                        </p:par>
+                        <p:par>
+                          <p:cTn id="48" fill="hold">
+                            <p:stCondLst>
+                              <p:cond delay="500"/>
+                            </p:stCondLst>
+                            <p:childTnLst>
+                              <p:par>
+                                <p:cTn id="49" presetID="19" presetClass="emph" presetSubtype="0" fill="hold" grpId="0" nodeType="afterEffect">
+                                  <p:stCondLst>
+                                    <p:cond delay="0"/>
+                                  </p:stCondLst>
+                                  <p:childTnLst>
+                                    <p:animClr clrSpc="rgb" dir="cw">
+                                      <p:cBhvr override="childStyle">
+                                        <p:cTn id="50" dur="500" fill="hold"/>
+                                        <p:tgtEl>
+                                          <p:spTgt spid="2">
+                                            <p:txEl>
+                                              <p:pRg st="0" end="0"/>
+                                            </p:txEl>
+                                          </p:spTgt>
+                                        </p:tgtEl>
+                                        <p:attrNameLst>
+                                          <p:attrName>style.color</p:attrName>
+                                        </p:attrNameLst>
+                                      </p:cBhvr>
+                                      <p:to>
+                                        <a:srgbClr val="70AD47"/>
+                                      </p:to>
+                                    </p:animClr>
+                                    <p:animClr clrSpc="rgb" dir="cw">
+                                      <p:cBhvr>
+                                        <p:cTn id="51" dur="500" fill="hold"/>
+                                        <p:tgtEl>
+                                          <p:spTgt spid="2">
+                                            <p:txEl>
+                                              <p:pRg st="0" end="0"/>
+                                            </p:txEl>
+                                          </p:spTgt>
+                                        </p:tgtEl>
+                                        <p:attrNameLst>
+                                          <p:attrName>fillcolor</p:attrName>
+                                        </p:attrNameLst>
+                                      </p:cBhvr>
+                                      <p:to>
+                                        <a:srgbClr val="70AD47"/>
+                                      </p:to>
+                                    </p:animClr>
+                                    <p:set>
+                                      <p:cBhvr>
+                                        <p:cTn id="52" dur="500" fill="hold"/>
+                                        <p:tgtEl>
+                                          <p:spTgt spid="2">
+                                            <p:txEl>
+                                              <p:pRg st="0" end="0"/>
+                                            </p:txEl>
+                                          </p:spTgt>
+                                        </p:tgtEl>
+                                        <p:attrNameLst>
+                                          <p:attrName>fill.type</p:attrName>
+                                        </p:attrNameLst>
+                                      </p:cBhvr>
+                                      <p:to>
+                                        <p:strVal val="solid"/>
+                                      </p:to>
+                                    </p:set>
+                                    <p:set>
+                                      <p:cBhvr>
+                                        <p:cTn id="53" dur="500" fill="hold"/>
+                                        <p:tgtEl>
+                                          <p:spTgt spid="2">
+                                            <p:txEl>
+                                              <p:pRg st="0" end="0"/>
+                                            </p:txEl>
+                                          </p:spTgt>
+                                        </p:tgtEl>
+                                        <p:attrNameLst>
+                                          <p:attrName>fill.on</p:attrName>
+                                        </p:attrNameLst>
+                                      </p:cBhvr>
+                                      <p:to>
+                                        <p:strVal val="true"/>
+                                      </p:to>
+                                    </p:set>
+                                  </p:childTnLst>
+                                </p:cTn>
+                              </p:par>
+                              <p:par>
+                                <p:cTn id="54" presetID="19" presetClass="emph" presetSubtype="0" fill="hold" nodeType="withEffect">
+                                  <p:stCondLst>
+                                    <p:cond delay="0"/>
+                                  </p:stCondLst>
+                                  <p:childTnLst>
+                                    <p:animClr clrSpc="rgb" dir="cw">
+                                      <p:cBhvr override="childStyle">
+                                        <p:cTn id="55" dur="500" fill="hold"/>
+                                        <p:tgtEl>
+                                          <p:spTgt spid="6">
+                                            <p:txEl>
+                                              <p:pRg st="0" end="0"/>
+                                            </p:txEl>
+                                          </p:spTgt>
+                                        </p:tgtEl>
+                                        <p:attrNameLst>
+                                          <p:attrName>style.color</p:attrName>
+                                        </p:attrNameLst>
+                                      </p:cBhvr>
+                                      <p:to>
+                                        <a:srgbClr val="FF0000"/>
+                                      </p:to>
+                                    </p:animClr>
+                                    <p:animClr clrSpc="rgb" dir="cw">
+                                      <p:cBhvr>
+                                        <p:cTn id="56" dur="500" fill="hold"/>
+                                        <p:tgtEl>
+                                          <p:spTgt spid="6">
+                                            <p:txEl>
+                                              <p:pRg st="0" end="0"/>
+                                            </p:txEl>
+                                          </p:spTgt>
+                                        </p:tgtEl>
+                                        <p:attrNameLst>
+                                          <p:attrName>fillcolor</p:attrName>
+                                        </p:attrNameLst>
+                                      </p:cBhvr>
+                                      <p:to>
+                                        <a:srgbClr val="FF0000"/>
+                                      </p:to>
+                                    </p:animClr>
+                                    <p:set>
+                                      <p:cBhvr>
+                                        <p:cTn id="57" dur="500" fill="hold"/>
+                                        <p:tgtEl>
+                                          <p:spTgt spid="6">
+                                            <p:txEl>
+                                              <p:pRg st="0" end="0"/>
+                                            </p:txEl>
+                                          </p:spTgt>
+                                        </p:tgtEl>
+                                        <p:attrNameLst>
+                                          <p:attrName>fill.type</p:attrName>
+                                        </p:attrNameLst>
+                                      </p:cBhvr>
+                                      <p:to>
+                                        <p:strVal val="solid"/>
+                                      </p:to>
+                                    </p:set>
+                                    <p:set>
+                                      <p:cBhvr>
+                                        <p:cTn id="58" dur="500" fill="hold"/>
+                                        <p:tgtEl>
+                                          <p:spTgt spid="6">
+                                            <p:txEl>
+                                              <p:pRg st="0" end="0"/>
+                                            </p:txEl>
+                                          </p:spTgt>
+                                        </p:tgtEl>
+                                        <p:attrNameLst>
+                                          <p:attrName>fill.on</p:attrName>
+                                        </p:attrNameLst>
+                                      </p:cBhvr>
+                                      <p:to>
+                                        <p:strVal val="true"/>
+                                      </p:to>
+                                    </p:set>
+                                  </p:childTnLst>
+                                </p:cTn>
+                              </p:par>
+                              <p:par>
+                                <p:cTn id="59" presetID="19" presetClass="emph" presetSubtype="0" fill="hold" nodeType="withEffect">
+                                  <p:stCondLst>
+                                    <p:cond delay="0"/>
+                                  </p:stCondLst>
+                                  <p:childTnLst>
+                                    <p:animClr clrSpc="rgb" dir="cw">
+                                      <p:cBhvr override="childStyle">
+                                        <p:cTn id="60" dur="500" fill="hold"/>
+                                        <p:tgtEl>
+                                          <p:spTgt spid="7">
+                                            <p:txEl>
+                                              <p:pRg st="0" end="0"/>
+                                            </p:txEl>
+                                          </p:spTgt>
+                                        </p:tgtEl>
+                                        <p:attrNameLst>
+                                          <p:attrName>style.color</p:attrName>
+                                        </p:attrNameLst>
+                                      </p:cBhvr>
+                                      <p:to>
+                                        <a:srgbClr val="FF0000"/>
+                                      </p:to>
+                                    </p:animClr>
+                                    <p:animClr clrSpc="rgb" dir="cw">
+                                      <p:cBhvr>
+                                        <p:cTn id="61" dur="500" fill="hold"/>
+                                        <p:tgtEl>
+                                          <p:spTgt spid="7">
+                                            <p:txEl>
+                                              <p:pRg st="0" end="0"/>
+                                            </p:txEl>
+                                          </p:spTgt>
+                                        </p:tgtEl>
+                                        <p:attrNameLst>
+                                          <p:attrName>fillcolor</p:attrName>
+                                        </p:attrNameLst>
+                                      </p:cBhvr>
+                                      <p:to>
+                                        <a:srgbClr val="FF0000"/>
+                                      </p:to>
+                                    </p:animClr>
+                                    <p:set>
+                                      <p:cBhvr>
+                                        <p:cTn id="62" dur="500" fill="hold"/>
+                                        <p:tgtEl>
+                                          <p:spTgt spid="7">
+                                            <p:txEl>
+                                              <p:pRg st="0" end="0"/>
+                                            </p:txEl>
+                                          </p:spTgt>
+                                        </p:tgtEl>
+                                        <p:attrNameLst>
+                                          <p:attrName>fill.type</p:attrName>
+                                        </p:attrNameLst>
+                                      </p:cBhvr>
+                                      <p:to>
+                                        <p:strVal val="solid"/>
+                                      </p:to>
+                                    </p:set>
+                                    <p:set>
+                                      <p:cBhvr>
+                                        <p:cTn id="63" dur="500" fill="hold"/>
+                                        <p:tgtEl>
+                                          <p:spTgt spid="7">
+                                            <p:txEl>
+                                              <p:pRg st="0" end="0"/>
+                                            </p:txEl>
+                                          </p:spTgt>
+                                        </p:tgtEl>
+                                        <p:attrNameLst>
+                                          <p:attrName>fill.on</p:attrName>
+                                        </p:attrNameLst>
+                                      </p:cBhvr>
+                                      <p:to>
+                                        <p:strVal val="true"/>
+                                      </p:to>
+                                    </p:set>
+                                  </p:childTnLst>
+                                </p:cTn>
+                              </p:par>
+                            </p:childTnLst>
+                          </p:cTn>
+                        </p:par>
+                      </p:childTnLst>
+                    </p:cTn>
+                  </p:par>
+                  <p:par>
+                    <p:cTn id="64" fill="hold">
+                      <p:stCondLst>
+                        <p:cond delay="indefinite"/>
+                      </p:stCondLst>
+                      <p:childTnLst>
+                        <p:par>
+                          <p:cTn id="65" fill="hold">
+                            <p:stCondLst>
+                              <p:cond delay="0"/>
+                            </p:stCondLst>
+                            <p:childTnLst>
+                              <p:par>
+                                <p:cTn id="66" presetID="19" presetClass="emph" presetSubtype="0" fill="hold" nodeType="clickEffect">
+                                  <p:stCondLst>
+                                    <p:cond delay="0"/>
+                                  </p:stCondLst>
+                                  <p:childTnLst>
+                                    <p:animClr clrSpc="rgb" dir="cw">
+                                      <p:cBhvr override="childStyle">
+                                        <p:cTn id="67" dur="500" fill="hold"/>
+                                        <p:tgtEl>
+                                          <p:spTgt spid="12">
+                                            <p:txEl>
+                                              <p:pRg st="0" end="0"/>
+                                            </p:txEl>
+                                          </p:spTgt>
+                                        </p:tgtEl>
+                                        <p:attrNameLst>
+                                          <p:attrName>style.color</p:attrName>
+                                        </p:attrNameLst>
+                                      </p:cBhvr>
+                                      <p:to>
+                                        <a:srgbClr val="70AD47"/>
+                                      </p:to>
+                                    </p:animClr>
+                                    <p:animClr clrSpc="rgb" dir="cw">
+                                      <p:cBhvr>
+                                        <p:cTn id="68" dur="500" fill="hold"/>
+                                        <p:tgtEl>
+                                          <p:spTgt spid="12">
+                                            <p:txEl>
+                                              <p:pRg st="0" end="0"/>
+                                            </p:txEl>
+                                          </p:spTgt>
+                                        </p:tgtEl>
+                                        <p:attrNameLst>
+                                          <p:attrName>fillcolor</p:attrName>
+                                        </p:attrNameLst>
+                                      </p:cBhvr>
+                                      <p:to>
+                                        <a:srgbClr val="70AD47"/>
+                                      </p:to>
+                                    </p:animClr>
+                                    <p:set>
+                                      <p:cBhvr>
+                                        <p:cTn id="69" dur="500" fill="hold"/>
+                                        <p:tgtEl>
+                                          <p:spTgt spid="12">
+                                            <p:txEl>
+                                              <p:pRg st="0" end="0"/>
+                                            </p:txEl>
+                                          </p:spTgt>
+                                        </p:tgtEl>
+                                        <p:attrNameLst>
+                                          <p:attrName>fill.type</p:attrName>
+                                        </p:attrNameLst>
+                                      </p:cBhvr>
+                                      <p:to>
+                                        <p:strVal val="solid"/>
+                                      </p:to>
+                                    </p:set>
+                                    <p:set>
+                                      <p:cBhvr>
+                                        <p:cTn id="70" dur="500" fill="hold"/>
+                                        <p:tgtEl>
+                                          <p:spTgt spid="12">
+                                            <p:txEl>
+                                              <p:pRg st="0" end="0"/>
+                                            </p:txEl>
+                                          </p:spTgt>
+                                        </p:tgtEl>
+                                        <p:attrNameLst>
+                                          <p:attrName>fill.on</p:attrName>
+                                        </p:attrNameLst>
+                                      </p:cBhvr>
+                                      <p:to>
+                                        <p:strVal val="true"/>
+                                      </p:to>
+                                    </p:set>
+                                  </p:childTnLst>
+                                </p:cTn>
+                              </p:par>
+                              <p:par>
+                                <p:cTn id="71" presetID="1" presetClass="emph" presetSubtype="2" fill="hold" nodeType="withEffect">
+                                  <p:stCondLst>
+                                    <p:cond delay="0"/>
+                                  </p:stCondLst>
+                                  <p:childTnLst>
+                                    <p:animClr clrSpc="rgb" dir="cw">
+                                      <p:cBhvr>
+                                        <p:cTn id="72" dur="500" fill="hold"/>
+                                        <p:tgtEl>
+                                          <p:spTgt spid="20"/>
+                                        </p:tgtEl>
+                                        <p:attrNameLst>
+                                          <p:attrName>fillcolor</p:attrName>
+                                        </p:attrNameLst>
+                                      </p:cBhvr>
+                                      <p:to>
+                                        <a:schemeClr val="tx1"/>
+                                      </p:to>
+                                    </p:animClr>
+                                    <p:set>
+                                      <p:cBhvr>
+                                        <p:cTn id="73" dur="500" fill="hold"/>
+                                        <p:tgtEl>
+                                          <p:spTgt spid="20"/>
+                                        </p:tgtEl>
+                                        <p:attrNameLst>
+                                          <p:attrName>fill.type</p:attrName>
+                                        </p:attrNameLst>
+                                      </p:cBhvr>
+                                      <p:to>
+                                        <p:strVal val="solid"/>
+                                      </p:to>
+                                    </p:set>
+                                    <p:set>
+                                      <p:cBhvr>
+                                        <p:cTn id="74" dur="500" fill="hold"/>
+                                        <p:tgtEl>
+                                          <p:spTgt spid="20"/>
+                                        </p:tgtEl>
+                                        <p:attrNameLst>
+                                          <p:attrName>fill.on</p:attrName>
+                                        </p:attrNameLst>
+                                      </p:cBhvr>
+                                      <p:to>
+                                        <p:strVal val="true"/>
+                                      </p:to>
+                                    </p:set>
+                                  </p:childTnLst>
+                                </p:cTn>
+                              </p:par>
+                            </p:childTnLst>
+                          </p:cTn>
+                        </p:par>
+                        <p:par>
+                          <p:cTn id="75" fill="hold">
+                            <p:stCondLst>
+                              <p:cond delay="500"/>
+                            </p:stCondLst>
+                            <p:childTnLst>
+                              <p:par>
+                                <p:cTn id="76" presetID="19" presetClass="emph" presetSubtype="0" fill="hold" nodeType="afterEffect">
+                                  <p:stCondLst>
+                                    <p:cond delay="0"/>
+                                  </p:stCondLst>
+                                  <p:childTnLst>
+                                    <p:animClr clrSpc="rgb" dir="cw">
+                                      <p:cBhvr override="childStyle">
+                                        <p:cTn id="77" dur="500" fill="hold"/>
+                                        <p:tgtEl>
+                                          <p:spTgt spid="14">
+                                            <p:txEl>
+                                              <p:pRg st="0" end="0"/>
+                                            </p:txEl>
+                                          </p:spTgt>
+                                        </p:tgtEl>
+                                        <p:attrNameLst>
+                                          <p:attrName>style.color</p:attrName>
+                                        </p:attrNameLst>
+                                      </p:cBhvr>
+                                      <p:to>
+                                        <a:schemeClr val="bg1"/>
+                                      </p:to>
+                                    </p:animClr>
+                                    <p:animClr clrSpc="rgb" dir="cw">
+                                      <p:cBhvr>
+                                        <p:cTn id="78" dur="500" fill="hold"/>
+                                        <p:tgtEl>
+                                          <p:spTgt spid="14">
+                                            <p:txEl>
+                                              <p:pRg st="0" end="0"/>
+                                            </p:txEl>
+                                          </p:spTgt>
+                                        </p:tgtEl>
+                                        <p:attrNameLst>
+                                          <p:attrName>fillcolor</p:attrName>
+                                        </p:attrNameLst>
+                                      </p:cBhvr>
+                                      <p:to>
+                                        <a:schemeClr val="bg1"/>
+                                      </p:to>
+                                    </p:animClr>
+                                    <p:set>
+                                      <p:cBhvr>
+                                        <p:cTn id="79" dur="500" fill="hold"/>
+                                        <p:tgtEl>
+                                          <p:spTgt spid="14">
+                                            <p:txEl>
+                                              <p:pRg st="0" end="0"/>
+                                            </p:txEl>
+                                          </p:spTgt>
+                                        </p:tgtEl>
+                                        <p:attrNameLst>
+                                          <p:attrName>fill.type</p:attrName>
+                                        </p:attrNameLst>
+                                      </p:cBhvr>
+                                      <p:to>
+                                        <p:strVal val="solid"/>
+                                      </p:to>
+                                    </p:set>
+                                    <p:set>
+                                      <p:cBhvr>
+                                        <p:cTn id="80" dur="500" fill="hold"/>
+                                        <p:tgtEl>
+                                          <p:spTgt spid="14">
+                                            <p:txEl>
+                                              <p:pRg st="0" end="0"/>
+                                            </p:txEl>
+                                          </p:spTgt>
+                                        </p:tgtEl>
+                                        <p:attrNameLst>
+                                          <p:attrName>fill.on</p:attrName>
+                                        </p:attrNameLst>
+                                      </p:cBhvr>
+                                      <p:to>
+                                        <p:strVal val="true"/>
+                                      </p:to>
+                                    </p:set>
+                                  </p:childTnLst>
+                                </p:cTn>
+                              </p:par>
+                              <p:par>
+                                <p:cTn id="81" presetID="19" presetClass="emph" presetSubtype="0" fill="hold" grpId="0" nodeType="withEffect">
+                                  <p:stCondLst>
+                                    <p:cond delay="0"/>
+                                  </p:stCondLst>
+                                  <p:childTnLst>
+                                    <p:animClr clrSpc="rgb" dir="cw">
+                                      <p:cBhvr override="childStyle">
+                                        <p:cTn id="82" dur="500" fill="hold"/>
+                                        <p:tgtEl>
+                                          <p:spTgt spid="21"/>
+                                        </p:tgtEl>
+                                        <p:attrNameLst>
+                                          <p:attrName>style.color</p:attrName>
+                                        </p:attrNameLst>
+                                      </p:cBhvr>
+                                      <p:to>
+                                        <a:srgbClr val="FF0000"/>
+                                      </p:to>
+                                    </p:animClr>
+                                    <p:animClr clrSpc="rgb" dir="cw">
+                                      <p:cBhvr>
+                                        <p:cTn id="83" dur="500" fill="hold"/>
+                                        <p:tgtEl>
+                                          <p:spTgt spid="21"/>
+                                        </p:tgtEl>
+                                        <p:attrNameLst>
+                                          <p:attrName>fillcolor</p:attrName>
+                                        </p:attrNameLst>
+                                      </p:cBhvr>
+                                      <p:to>
+                                        <a:srgbClr val="FF0000"/>
+                                      </p:to>
+                                    </p:animClr>
+                                    <p:set>
+                                      <p:cBhvr>
+                                        <p:cTn id="84" dur="500" fill="hold"/>
+                                        <p:tgtEl>
+                                          <p:spTgt spid="21"/>
+                                        </p:tgtEl>
+                                        <p:attrNameLst>
+                                          <p:attrName>fill.type</p:attrName>
+                                        </p:attrNameLst>
+                                      </p:cBhvr>
+                                      <p:to>
+                                        <p:strVal val="solid"/>
+                                      </p:to>
+                                    </p:set>
+                                    <p:set>
+                                      <p:cBhvr>
+                                        <p:cTn id="85" dur="500" fill="hold"/>
+                                        <p:tgtEl>
+                                          <p:spTgt spid="21"/>
+                                        </p:tgtEl>
+                                        <p:attrNameLst>
+                                          <p:attrName>fill.on</p:attrName>
+                                        </p:attrNameLst>
+                                      </p:cBhvr>
+                                      <p:to>
+                                        <p:strVal val="true"/>
+                                      </p:to>
+                                    </p:set>
+                                  </p:childTnLst>
+                                </p:cTn>
+                              </p:par>
+                            </p:childTnLst>
+                          </p:cTn>
+                        </p:par>
+                        <p:par>
+                          <p:cTn id="86" fill="hold">
+                            <p:stCondLst>
+                              <p:cond delay="1000"/>
+                            </p:stCondLst>
+                            <p:childTnLst>
+                              <p:par>
+                                <p:cTn id="87" presetID="19" presetClass="emph" presetSubtype="0" fill="hold" grpId="0" nodeType="afterEffect">
+                                  <p:stCondLst>
+                                    <p:cond delay="0"/>
+                                  </p:stCondLst>
+                                  <p:childTnLst>
+                                    <p:animClr clrSpc="rgb" dir="cw">
+                                      <p:cBhvr override="childStyle">
+                                        <p:cTn id="88" dur="500" fill="hold"/>
+                                        <p:tgtEl>
+                                          <p:spTgt spid="7">
+                                            <p:txEl>
+                                              <p:pRg st="0" end="0"/>
+                                            </p:txEl>
+                                          </p:spTgt>
+                                        </p:tgtEl>
+                                        <p:attrNameLst>
+                                          <p:attrName>style.color</p:attrName>
+                                        </p:attrNameLst>
+                                      </p:cBhvr>
+                                      <p:to>
+                                        <a:srgbClr val="70AD47"/>
+                                      </p:to>
+                                    </p:animClr>
+                                    <p:animClr clrSpc="rgb" dir="cw">
+                                      <p:cBhvr>
+                                        <p:cTn id="89" dur="500" fill="hold"/>
+                                        <p:tgtEl>
+                                          <p:spTgt spid="7">
+                                            <p:txEl>
+                                              <p:pRg st="0" end="0"/>
+                                            </p:txEl>
+                                          </p:spTgt>
+                                        </p:tgtEl>
+                                        <p:attrNameLst>
+                                          <p:attrName>fillcolor</p:attrName>
+                                        </p:attrNameLst>
+                                      </p:cBhvr>
+                                      <p:to>
+                                        <a:srgbClr val="70AD47"/>
+                                      </p:to>
+                                    </p:animClr>
+                                    <p:set>
+                                      <p:cBhvr>
+                                        <p:cTn id="90" dur="500" fill="hold"/>
+                                        <p:tgtEl>
+                                          <p:spTgt spid="7">
+                                            <p:txEl>
+                                              <p:pRg st="0" end="0"/>
+                                            </p:txEl>
+                                          </p:spTgt>
+                                        </p:tgtEl>
+                                        <p:attrNameLst>
+                                          <p:attrName>fill.type</p:attrName>
+                                        </p:attrNameLst>
+                                      </p:cBhvr>
+                                      <p:to>
+                                        <p:strVal val="solid"/>
+                                      </p:to>
+                                    </p:set>
+                                    <p:set>
+                                      <p:cBhvr>
+                                        <p:cTn id="91" dur="500" fill="hold"/>
+                                        <p:tgtEl>
+                                          <p:spTgt spid="7">
+                                            <p:txEl>
+                                              <p:pRg st="0" end="0"/>
+                                            </p:txEl>
+                                          </p:spTgt>
+                                        </p:tgtEl>
+                                        <p:attrNameLst>
+                                          <p:attrName>fill.on</p:attrName>
+                                        </p:attrNameLst>
+                                      </p:cBhvr>
+                                      <p:to>
+                                        <p:strVal val="true"/>
+                                      </p:to>
+                                    </p:set>
+                                  </p:childTnLst>
+                                </p:cTn>
+                              </p:par>
+                            </p:childTnLst>
+                          </p:cTn>
+                        </p:par>
+                      </p:childTnLst>
+                    </p:cTn>
+                  </p:par>
+                </p:childTnLst>
+              </p:cTn>
+              <p:prevCondLst>
+                <p:cond evt="onPrev" delay="0">
+                  <p:tgtEl>
+                    <p:sldTgt/>
+                  </p:tgtEl>
+                </p:cond>
+              </p:prevCondLst>
+              <p:nextCondLst>
+                <p:cond evt="onNext" delay="0">
+                  <p:tgtEl>
+                    <p:sldTgt/>
+                  </p:tgtEl>
+                </p:cond>
+              </p:nextCondLst>
+            </p:seq>
+          </p:childTnLst>
+        </p:cTn>
+      </p:par>
+    </p:tnLst>
+    <p:bldLst>
+      <p:bldP spid="27" grpId="0"/>
+      <p:bldP spid="2" grpId="0" build="allAtOnce"/>
+      <p:bldP spid="7" grpId="0" build="allAtOnce"/>
+      <p:bldP spid="8" grpId="0"/>
+      <p:bldP spid="20" grpId="0" animBg="1"/>
+      <p:bldP spid="12" grpId="0" build="allAtOnce"/>
+      <p:bldP spid="21" grpId="0" animBg="1"/>
+      <p:bldP spid="21" grpId="1" animBg="1"/>
+      <p:bldP spid="14" grpId="0" build="allAtOnce"/>
+    </p:bldLst>
+  </p:timing>
+</p:sld>
+</file>
+
+<file path=ppt/slides/slide3.xml><?xml version="1.0" encoding="utf-8"?>
+<p:sld xmlns:a="http://schemas.openxmlformats.org/drawingml/2006/main" xmlns:r="http://schemas.openxmlformats.org/officeDocument/2006/relationships" xmlns:p="http://schemas.openxmlformats.org/presentationml/2006/main">
+  <p:cSld>
+    <p:bg>
+      <p:bgPr>
+        <a:solidFill>
+          <a:schemeClr val="tx1"/>
+        </a:solidFill>
+        <a:effectLst/>
+      </p:bgPr>
+    </p:bg>
+    <p:spTree>
+      <p:nvGrpSpPr>
+        <p:cNvPr id="1" name=""/>
+        <p:cNvGrpSpPr/>
+        <p:nvPr/>
+      </p:nvGrpSpPr>
+      <p:grpSpPr>
+        <a:xfrm>
+          <a:off x="0" y="0"/>
+          <a:ext cx="0" cy="0"/>
+          <a:chOff x="0" y="0"/>
+          <a:chExt cx="0" cy="0"/>
+        </a:xfrm>
+      </p:grpSpPr>
+      <p:pic>
+        <p:nvPicPr>
+          <p:cNvPr id="5" name="Picture 4" descr="A screen with text on it">
+            <a:extLst>
+              <a:ext uri="{FF2B5EF4-FFF2-40B4-BE49-F238E27FC236}">
+                <a16:creationId xmlns:a16="http://schemas.microsoft.com/office/drawing/2014/main" id="{A7F2A094-158D-4622-1919-784BDD5CBE84}"/>
+              </a:ext>
+            </a:extLst>
+          </p:cNvPr>
+          <p:cNvPicPr>
+            <a:picLocks noChangeAspect="1"/>
+          </p:cNvPicPr>
+          <p:nvPr/>
+        </p:nvPicPr>
+        <p:blipFill>
+          <a:blip r:embed="rId2">
+            <a:extLst>
+              <a:ext uri="{28A0092B-C50C-407E-A947-70E740481C1C}">
+                <a14:useLocalDpi xmlns:a14="http://schemas.microsoft.com/office/drawing/2010/main" val="0"/>
+              </a:ext>
+            </a:extLst>
+          </a:blip>
+          <a:stretch>
+            <a:fillRect/>
+          </a:stretch>
+        </p:blipFill>
+        <p:spPr>
+          <a:xfrm>
+            <a:off x="152400" y="5585460"/>
+            <a:ext cx="1868365" cy="1121019"/>
+          </a:xfrm>
+          <a:prstGeom prst="rect">
+            <a:avLst/>
+          </a:prstGeom>
+        </p:spPr>
+      </p:pic>
+      <p:pic>
+        <p:nvPicPr>
+          <p:cNvPr id="26" name="Picture 2" descr="Steam Logo PNG Vector (EPS) Free Download">
+            <a:extLst>
+              <a:ext uri="{FF2B5EF4-FFF2-40B4-BE49-F238E27FC236}">
+                <a16:creationId xmlns:a16="http://schemas.microsoft.com/office/drawing/2014/main" id="{5C4D943E-84A7-CECD-20B4-D2A3D5E350FF}"/>
+              </a:ext>
+            </a:extLst>
+          </p:cNvPr>
+          <p:cNvPicPr>
+            <a:picLocks noChangeAspect="1" noChangeArrowheads="1"/>
+          </p:cNvPicPr>
+          <p:nvPr/>
+        </p:nvPicPr>
+        <p:blipFill>
+          <a:blip r:embed="rId3">
+            <a:extLst>
+              <a:ext uri="{28A0092B-C50C-407E-A947-70E740481C1C}">
+                <a14:useLocalDpi xmlns:a14="http://schemas.microsoft.com/office/drawing/2010/main" val="0"/>
+              </a:ext>
+            </a:extLst>
+          </a:blip>
+          <a:srcRect/>
+          <a:stretch>
+            <a:fillRect/>
+          </a:stretch>
+        </p:blipFill>
+        <p:spPr bwMode="auto">
+          <a:xfrm>
+            <a:off x="5513981" y="664880"/>
+            <a:ext cx="1164037" cy="1160158"/>
+          </a:xfrm>
+          <a:prstGeom prst="rect">
+            <a:avLst/>
+          </a:prstGeom>
+          <a:noFill/>
+          <a:extLst>
+            <a:ext uri="{909E8E84-426E-40DD-AFC4-6F175D3DCCD1}">
+              <a14:hiddenFill xmlns:a14="http://schemas.microsoft.com/office/drawing/2010/main">
+                <a:solidFill>
+                  <a:srgbClr val="FFFFFF"/>
+                </a:solidFill>
+              </a14:hiddenFill>
+            </a:ext>
+          </a:extLst>
+        </p:spPr>
+      </p:pic>
+      <p:sp>
+        <p:nvSpPr>
+          <p:cNvPr id="2" name="TextBox 1">
+            <a:extLst>
+              <a:ext uri="{FF2B5EF4-FFF2-40B4-BE49-F238E27FC236}">
+                <a16:creationId xmlns:a16="http://schemas.microsoft.com/office/drawing/2014/main" id="{D171AF14-B957-940D-9B9E-11004CF5EB94}"/>
+              </a:ext>
+            </a:extLst>
+          </p:cNvPr>
+          <p:cNvSpPr txBox="1"/>
+          <p:nvPr/>
+        </p:nvSpPr>
+        <p:spPr>
+          <a:xfrm>
+            <a:off x="5056150" y="1938204"/>
+            <a:ext cx="2234431" cy="646331"/>
+          </a:xfrm>
+          <a:prstGeom prst="rect">
+            <a:avLst/>
+          </a:prstGeom>
+          <a:noFill/>
+        </p:spPr>
+        <p:txBody>
+          <a:bodyPr wrap="square" rtlCol="0">
+            <a:spAutoFit/>
+          </a:bodyPr>
+          <a:lstStyle/>
+          <a:p>
+            <a:r>
+              <a:rPr lang="en-US" sz="3600" dirty="0">
+                <a:solidFill>
+                  <a:schemeClr val="bg1"/>
+                </a:solidFill>
+              </a:rPr>
+              <a:t>LG9158 TV</a:t>
+            </a:r>
+            <a:endParaRPr lang="sv-SE" sz="3600" dirty="0">
+              <a:solidFill>
+                <a:schemeClr val="bg1"/>
+              </a:solidFill>
+            </a:endParaRPr>
+          </a:p>
+        </p:txBody>
+      </p:sp>
+      <p:sp>
+        <p:nvSpPr>
+          <p:cNvPr id="8" name="TextBox 7">
+            <a:extLst>
+              <a:ext uri="{FF2B5EF4-FFF2-40B4-BE49-F238E27FC236}">
+                <a16:creationId xmlns:a16="http://schemas.microsoft.com/office/drawing/2014/main" id="{F3E7B99D-FF1E-4B58-2F55-2CA69C5695D0}"/>
+              </a:ext>
+            </a:extLst>
+          </p:cNvPr>
+          <p:cNvSpPr txBox="1"/>
+          <p:nvPr/>
+        </p:nvSpPr>
+        <p:spPr>
+          <a:xfrm>
+            <a:off x="4399138" y="3350136"/>
+            <a:ext cx="3393722" cy="923330"/>
+          </a:xfrm>
+          <a:prstGeom prst="rect">
+            <a:avLst/>
+          </a:prstGeom>
+          <a:noFill/>
+        </p:spPr>
+        <p:txBody>
+          <a:bodyPr wrap="square" rtlCol="0">
+            <a:spAutoFit/>
+          </a:bodyPr>
+          <a:lstStyle/>
+          <a:p>
+            <a:pPr algn="ctr"/>
+            <a:r>
+              <a:rPr lang="sv-SE" dirty="0">
+                <a:solidFill>
+                  <a:schemeClr val="bg1"/>
+                </a:solidFill>
+              </a:rPr>
+              <a:t>Must Monitor be the only enabled screen in order to trigger reaction?:</a:t>
+            </a:r>
+          </a:p>
+        </p:txBody>
+      </p:sp>
+      <p:sp>
+        <p:nvSpPr>
+          <p:cNvPr id="20" name="Oval 19">
+            <a:extLst>
+              <a:ext uri="{FF2B5EF4-FFF2-40B4-BE49-F238E27FC236}">
+                <a16:creationId xmlns:a16="http://schemas.microsoft.com/office/drawing/2014/main" id="{569FDC5F-5980-A875-6E89-0F3CFF8AF2B7}"/>
+              </a:ext>
+            </a:extLst>
+          </p:cNvPr>
+          <p:cNvSpPr/>
+          <p:nvPr/>
+        </p:nvSpPr>
+        <p:spPr>
+          <a:xfrm>
+            <a:off x="5051137" y="4273466"/>
+            <a:ext cx="835890" cy="835890"/>
+          </a:xfrm>
+          <a:prstGeom prst="ellipse">
+            <a:avLst/>
+          </a:prstGeom>
+          <a:solidFill>
+            <a:schemeClr val="tx1"/>
+          </a:solidFill>
+          <a:ln>
+            <a:solidFill>
+              <a:srgbClr val="70AD47"/>
+            </a:solidFill>
+          </a:ln>
+        </p:spPr>
+        <p:style>
+          <a:lnRef idx="2">
+            <a:schemeClr val="accent1">
+              <a:shade val="50000"/>
+            </a:schemeClr>
+          </a:lnRef>
+          <a:fillRef idx="1">
+            <a:schemeClr val="accent1"/>
+          </a:fillRef>
+          <a:effectRef idx="0">
+            <a:schemeClr val="accent1"/>
+          </a:effectRef>
+          <a:fontRef idx="minor">
+            <a:schemeClr val="lt1"/>
+          </a:fontRef>
+        </p:style>
+        <p:txBody>
+          <a:bodyPr rtlCol="0" anchor="ctr"/>
+          <a:lstStyle/>
+          <a:p>
+            <a:pPr algn="ctr"/>
+            <a:endParaRPr lang="sv-SE"/>
+          </a:p>
+        </p:txBody>
+      </p:sp>
+      <p:sp>
+        <p:nvSpPr>
+          <p:cNvPr id="12" name="TextBox 11">
+            <a:extLst>
+              <a:ext uri="{FF2B5EF4-FFF2-40B4-BE49-F238E27FC236}">
+                <a16:creationId xmlns:a16="http://schemas.microsoft.com/office/drawing/2014/main" id="{03CAC4CB-9F78-08FC-8A9C-31C4F84D9C32}"/>
+              </a:ext>
+            </a:extLst>
+          </p:cNvPr>
+          <p:cNvSpPr txBox="1"/>
+          <p:nvPr/>
+        </p:nvSpPr>
+        <p:spPr>
+          <a:xfrm>
+            <a:off x="5088529" y="4452884"/>
+            <a:ext cx="761106" cy="477054"/>
+          </a:xfrm>
+          <a:prstGeom prst="rect">
+            <a:avLst/>
+          </a:prstGeom>
+          <a:noFill/>
+        </p:spPr>
+        <p:txBody>
+          <a:bodyPr wrap="none" rtlCol="0">
+            <a:spAutoFit/>
+          </a:bodyPr>
+          <a:lstStyle/>
+          <a:p>
+            <a:r>
+              <a:rPr lang="sv-SE" sz="2500" dirty="0">
+                <a:solidFill>
+                  <a:schemeClr val="accent6"/>
+                </a:solidFill>
+              </a:rPr>
+              <a:t>True</a:t>
+            </a:r>
+          </a:p>
+        </p:txBody>
+      </p:sp>
+      <p:sp>
+        <p:nvSpPr>
+          <p:cNvPr id="21" name="Oval 20">
+            <a:extLst>
+              <a:ext uri="{FF2B5EF4-FFF2-40B4-BE49-F238E27FC236}">
+                <a16:creationId xmlns:a16="http://schemas.microsoft.com/office/drawing/2014/main" id="{561CE001-5D64-5388-1D1D-4791B1097205}"/>
+              </a:ext>
+            </a:extLst>
+          </p:cNvPr>
+          <p:cNvSpPr/>
+          <p:nvPr/>
+        </p:nvSpPr>
+        <p:spPr>
+          <a:xfrm>
+            <a:off x="6413208" y="4273466"/>
+            <a:ext cx="835890" cy="835890"/>
+          </a:xfrm>
+          <a:prstGeom prst="ellipse">
+            <a:avLst/>
+          </a:prstGeom>
+          <a:solidFill>
+            <a:schemeClr val="tx1"/>
+          </a:solidFill>
+          <a:ln>
+            <a:solidFill>
+              <a:srgbClr val="FF0000"/>
+            </a:solidFill>
+          </a:ln>
+        </p:spPr>
+        <p:style>
+          <a:lnRef idx="2">
+            <a:schemeClr val="accent1">
+              <a:shade val="50000"/>
+            </a:schemeClr>
+          </a:lnRef>
+          <a:fillRef idx="1">
+            <a:schemeClr val="accent1"/>
+          </a:fillRef>
+          <a:effectRef idx="0">
+            <a:schemeClr val="accent1"/>
+          </a:effectRef>
+          <a:fontRef idx="minor">
+            <a:schemeClr val="lt1"/>
+          </a:fontRef>
+        </p:style>
+        <p:txBody>
+          <a:bodyPr rtlCol="0" anchor="ctr"/>
+          <a:lstStyle/>
+          <a:p>
+            <a:pPr algn="ctr"/>
+            <a:endParaRPr lang="sv-SE"/>
+          </a:p>
+        </p:txBody>
+      </p:sp>
+      <p:sp>
+        <p:nvSpPr>
+          <p:cNvPr id="14" name="TextBox 13">
+            <a:extLst>
+              <a:ext uri="{FF2B5EF4-FFF2-40B4-BE49-F238E27FC236}">
+                <a16:creationId xmlns:a16="http://schemas.microsoft.com/office/drawing/2014/main" id="{6C2A2586-0913-4A68-2744-B56D4B25AAAD}"/>
+              </a:ext>
+            </a:extLst>
+          </p:cNvPr>
+          <p:cNvSpPr txBox="1"/>
+          <p:nvPr/>
+        </p:nvSpPr>
+        <p:spPr>
+          <a:xfrm>
+            <a:off x="6430168" y="4452884"/>
+            <a:ext cx="836511" cy="477054"/>
+          </a:xfrm>
+          <a:prstGeom prst="rect">
+            <a:avLst/>
+          </a:prstGeom>
+          <a:noFill/>
+        </p:spPr>
+        <p:txBody>
+          <a:bodyPr wrap="none" rtlCol="0">
+            <a:spAutoFit/>
+          </a:bodyPr>
+          <a:lstStyle/>
+          <a:p>
+            <a:r>
+              <a:rPr lang="sv-SE" sz="2500" dirty="0">
+                <a:solidFill>
+                  <a:srgbClr val="FF0000"/>
+                </a:solidFill>
+              </a:rPr>
+              <a:t>False</a:t>
+            </a:r>
+          </a:p>
+        </p:txBody>
+      </p:sp>
+      <p:sp>
+        <p:nvSpPr>
+          <p:cNvPr id="3" name="TextBox 2">
+            <a:extLst>
+              <a:ext uri="{FF2B5EF4-FFF2-40B4-BE49-F238E27FC236}">
+                <a16:creationId xmlns:a16="http://schemas.microsoft.com/office/drawing/2014/main" id="{81B022CA-A816-2557-368C-8C5995386B20}"/>
+              </a:ext>
+            </a:extLst>
+          </p:cNvPr>
+          <p:cNvSpPr txBox="1"/>
+          <p:nvPr/>
+        </p:nvSpPr>
+        <p:spPr>
+          <a:xfrm>
+            <a:off x="4512154" y="2640636"/>
+            <a:ext cx="3167689" cy="461665"/>
+          </a:xfrm>
+          <a:prstGeom prst="rect">
+            <a:avLst/>
+          </a:prstGeom>
+          <a:noFill/>
+        </p:spPr>
+        <p:txBody>
+          <a:bodyPr wrap="square" rtlCol="0">
+            <a:spAutoFit/>
+          </a:bodyPr>
+          <a:lstStyle/>
+          <a:p>
+            <a:r>
+              <a:rPr lang="en-US" sz="2400" dirty="0">
+                <a:solidFill>
+                  <a:schemeClr val="tx1">
+                    <a:lumMod val="65000"/>
+                    <a:lumOff val="35000"/>
+                  </a:schemeClr>
+                </a:solidFill>
+              </a:rPr>
+              <a:t>Arguments: </a:t>
+            </a:r>
+            <a:r>
+              <a:rPr lang="en-US" sz="2400" dirty="0">
+                <a:solidFill>
+                  <a:schemeClr val="bg1"/>
+                </a:solidFill>
+              </a:rPr>
+              <a:t>-</a:t>
+            </a:r>
+            <a:r>
+              <a:rPr lang="en-US" sz="2400" dirty="0" err="1">
+                <a:solidFill>
+                  <a:schemeClr val="bg1"/>
+                </a:solidFill>
+              </a:rPr>
+              <a:t>bigpicture</a:t>
+            </a:r>
+            <a:endParaRPr lang="sv-SE" sz="2400" dirty="0">
+              <a:solidFill>
+                <a:schemeClr val="bg1"/>
+              </a:solidFill>
+            </a:endParaRPr>
+          </a:p>
+        </p:txBody>
+      </p:sp>
+    </p:spTree>
+    <p:extLst>
+      <p:ext uri="{BB962C8B-B14F-4D97-AF65-F5344CB8AC3E}">
+        <p14:creationId xmlns:p14="http://schemas.microsoft.com/office/powerpoint/2010/main" val="3498381181"/>
+      </p:ext>
+    </p:extLst>
+  </p:cSld>
+  <p:clrMapOvr>
+    <a:masterClrMapping/>
+  </p:clrMapOvr>
+  <mc:AlternateContent xmlns:mc="http://schemas.openxmlformats.org/markup-compatibility/2006">
+    <mc:Choice xmlns:p159="http://schemas.microsoft.com/office/powerpoint/2015/09/main" Requires="p159">
+      <p:transition xmlns:p14="http://schemas.microsoft.com/office/powerpoint/2010/main" spd="slow" p14:dur="2000">
+        <p159:morph option="byObject"/>
+      </p:transition>
+    </mc:Choice>
+    <mc:Fallback>
+      <p:transition spd="slow">
+        <p:fade/>
+      </p:transition>
+    </mc:Fallback>
+  </mc:AlternateContent>
+  <p:timing>
+    <p:tnLst>
+      <p:par>
+        <p:cTn id="1" dur="indefinite" restart="never" nodeType="tmRoot">
+          <p:childTnLst>
+            <p:seq concurrent="1" nextAc="seek">
+              <p:cTn id="2" dur="indefinite" nodeType="mainSeq">
+                <p:childTnLst>
+                  <p:par>
+                    <p:cTn id="3" fill="hold">
+                      <p:stCondLst>
+                        <p:cond delay="indefinite"/>
+                      </p:stCondLst>
+                      <p:childTnLst>
+                        <p:par>
+                          <p:cTn id="4" fill="hold">
+                            <p:stCondLst>
+                              <p:cond delay="0"/>
+                            </p:stCondLst>
+                            <p:childTnLst>
+                              <p:par>
+                                <p:cTn id="5" presetID="19" presetClass="emph" presetSubtype="0" fill="hold" nodeType="clickEffect">
+                                  <p:stCondLst>
+                                    <p:cond delay="0"/>
+                                  </p:stCondLst>
+                                  <p:childTnLst>
+                                    <p:animClr clrSpc="rgb" dir="cw">
+                                      <p:cBhvr override="childStyle">
+                                        <p:cTn id="6" dur="500" fill="hold"/>
+                                        <p:tgtEl>
+                                          <p:spTgt spid="12">
+                                            <p:txEl>
+                                              <p:pRg st="0" end="0"/>
+                                            </p:txEl>
+                                          </p:spTgt>
+                                        </p:tgtEl>
+                                        <p:attrNameLst>
+                                          <p:attrName>style.color</p:attrName>
+                                        </p:attrNameLst>
+                                      </p:cBhvr>
+                                      <p:to>
+                                        <a:schemeClr val="bg1"/>
+                                      </p:to>
+                                    </p:animClr>
+                                    <p:animClr clrSpc="rgb" dir="cw">
+                                      <p:cBhvr>
+                                        <p:cTn id="7" dur="500" fill="hold"/>
+                                        <p:tgtEl>
+                                          <p:spTgt spid="12">
+                                            <p:txEl>
+                                              <p:pRg st="0" end="0"/>
+                                            </p:txEl>
+                                          </p:spTgt>
+                                        </p:tgtEl>
+                                        <p:attrNameLst>
+                                          <p:attrName>fillcolor</p:attrName>
+                                        </p:attrNameLst>
+                                      </p:cBhvr>
+                                      <p:to>
+                                        <a:schemeClr val="bg1"/>
+                                      </p:to>
+                                    </p:animClr>
+                                    <p:set>
+                                      <p:cBhvr>
+                                        <p:cTn id="8" dur="500" fill="hold"/>
+                                        <p:tgtEl>
+                                          <p:spTgt spid="12">
+                                            <p:txEl>
+                                              <p:pRg st="0" end="0"/>
+                                            </p:txEl>
+                                          </p:spTgt>
+                                        </p:tgtEl>
+                                        <p:attrNameLst>
+                                          <p:attrName>fill.type</p:attrName>
+                                        </p:attrNameLst>
+                                      </p:cBhvr>
+                                      <p:to>
+                                        <p:strVal val="solid"/>
+                                      </p:to>
+                                    </p:set>
+                                    <p:set>
+                                      <p:cBhvr>
+                                        <p:cTn id="9" dur="500" fill="hold"/>
+                                        <p:tgtEl>
+                                          <p:spTgt spid="12">
+                                            <p:txEl>
+                                              <p:pRg st="0" end="0"/>
+                                            </p:txEl>
+                                          </p:spTgt>
+                                        </p:tgtEl>
+                                        <p:attrNameLst>
+                                          <p:attrName>fill.on</p:attrName>
+                                        </p:attrNameLst>
+                                      </p:cBhvr>
+                                      <p:to>
+                                        <p:strVal val="true"/>
+                                      </p:to>
+                                    </p:set>
+                                  </p:childTnLst>
+                                </p:cTn>
+                              </p:par>
+                              <p:par>
+                                <p:cTn id="10" presetID="1" presetClass="emph" presetSubtype="2" fill="hold" nodeType="withEffect">
+                                  <p:stCondLst>
+                                    <p:cond delay="0"/>
+                                  </p:stCondLst>
+                                  <p:childTnLst>
+                                    <p:animClr clrSpc="rgb" dir="cw">
+                                      <p:cBhvr>
+                                        <p:cTn id="11" dur="500" fill="hold"/>
+                                        <p:tgtEl>
+                                          <p:spTgt spid="20"/>
+                                        </p:tgtEl>
+                                        <p:attrNameLst>
+                                          <p:attrName>fillcolor</p:attrName>
+                                        </p:attrNameLst>
+                                      </p:cBhvr>
+                                      <p:to>
+                                        <a:srgbClr val="70AD47"/>
+                                      </p:to>
+                                    </p:animClr>
+                                    <p:set>
+                                      <p:cBhvr>
+                                        <p:cTn id="12" dur="500" fill="hold"/>
+                                        <p:tgtEl>
+                                          <p:spTgt spid="20"/>
+                                        </p:tgtEl>
+                                        <p:attrNameLst>
+                                          <p:attrName>fill.type</p:attrName>
+                                        </p:attrNameLst>
+                                      </p:cBhvr>
+                                      <p:to>
+                                        <p:strVal val="solid"/>
+                                      </p:to>
+                                    </p:set>
+                                    <p:set>
+                                      <p:cBhvr>
+                                        <p:cTn id="13" dur="500" fill="hold"/>
+                                        <p:tgtEl>
+                                          <p:spTgt spid="20"/>
+                                        </p:tgtEl>
+                                        <p:attrNameLst>
+                                          <p:attrName>fill.on</p:attrName>
+                                        </p:attrNameLst>
+                                      </p:cBhvr>
+                                      <p:to>
+                                        <p:strVal val="true"/>
+                                      </p:to>
+                                    </p:set>
+                                  </p:childTnLst>
+                                </p:cTn>
+                              </p:par>
+                            </p:childTnLst>
+                          </p:cTn>
+                        </p:par>
+                      </p:childTnLst>
+                    </p:cTn>
+                  </p:par>
+                </p:childTnLst>
+              </p:cTn>
+              <p:prevCondLst>
+                <p:cond evt="onPrev" delay="0">
+                  <p:tgtEl>
+                    <p:sldTgt/>
+                  </p:tgtEl>
+                </p:cond>
+              </p:prevCondLst>
+              <p:nextCondLst>
+                <p:cond evt="onNext" delay="0">
+                  <p:tgtEl>
+                    <p:sldTgt/>
+                  </p:tgtEl>
+                </p:cond>
+              </p:nextCondLst>
+            </p:seq>
+          </p:childTnLst>
+        </p:cTn>
+      </p:par>
+    </p:tnLst>
+  </p:timing>
+</p:sld>
+</file>
+
+<file path=ppt/slides/slide4.xml><?xml version="1.0" encoding="utf-8"?>
+<p:sld xmlns:a="http://schemas.openxmlformats.org/drawingml/2006/main" xmlns:r="http://schemas.openxmlformats.org/officeDocument/2006/relationships" xmlns:p="http://schemas.openxmlformats.org/presentationml/2006/main">
+  <p:cSld>
+    <p:bg>
+      <p:bgPr>
+        <a:solidFill>
+          <a:schemeClr val="tx1"/>
+        </a:solidFill>
+        <a:effectLst/>
+      </p:bgPr>
+    </p:bg>
+    <p:spTree>
+      <p:nvGrpSpPr>
+        <p:cNvPr id="1" name=""/>
+        <p:cNvGrpSpPr/>
+        <p:nvPr/>
+      </p:nvGrpSpPr>
+      <p:grpSpPr>
+        <a:xfrm>
+          <a:off x="0" y="0"/>
+          <a:ext cx="0" cy="0"/>
+          <a:chOff x="0" y="0"/>
+          <a:chExt cx="0" cy="0"/>
+        </a:xfrm>
+      </p:grpSpPr>
+      <p:pic>
+        <p:nvPicPr>
+          <p:cNvPr id="5" name="Picture 4" descr="A screen with text on it">
+            <a:extLst>
+              <a:ext uri="{FF2B5EF4-FFF2-40B4-BE49-F238E27FC236}">
+                <a16:creationId xmlns:a16="http://schemas.microsoft.com/office/drawing/2014/main" id="{A7F2A094-158D-4622-1919-784BDD5CBE84}"/>
+              </a:ext>
+            </a:extLst>
+          </p:cNvPr>
+          <p:cNvPicPr>
+            <a:picLocks noChangeAspect="1"/>
+          </p:cNvPicPr>
+          <p:nvPr/>
+        </p:nvPicPr>
+        <p:blipFill>
+          <a:blip r:embed="rId2">
+            <a:extLst>
+              <a:ext uri="{28A0092B-C50C-407E-A947-70E740481C1C}">
+                <a14:useLocalDpi xmlns:a14="http://schemas.microsoft.com/office/drawing/2010/main" val="0"/>
+              </a:ext>
+            </a:extLst>
+          </a:blip>
+          <a:stretch>
+            <a:fillRect/>
+          </a:stretch>
+        </p:blipFill>
+        <p:spPr>
+          <a:xfrm>
+            <a:off x="4066949" y="637081"/>
+            <a:ext cx="4058102" cy="2434861"/>
+          </a:xfrm>
+          <a:prstGeom prst="rect">
+            <a:avLst/>
+          </a:prstGeom>
+        </p:spPr>
+      </p:pic>
+      <p:pic>
+        <p:nvPicPr>
+          <p:cNvPr id="26" name="Picture 2" descr="Steam Logo PNG Vector (EPS) Free Download">
+            <a:extLst>
+              <a:ext uri="{FF2B5EF4-FFF2-40B4-BE49-F238E27FC236}">
+                <a16:creationId xmlns:a16="http://schemas.microsoft.com/office/drawing/2014/main" id="{5C4D943E-84A7-CECD-20B4-D2A3D5E350FF}"/>
+              </a:ext>
+            </a:extLst>
+          </p:cNvPr>
+          <p:cNvPicPr>
+            <a:picLocks noChangeAspect="1" noChangeArrowheads="1"/>
+          </p:cNvPicPr>
+          <p:nvPr/>
+        </p:nvPicPr>
+        <p:blipFill>
+          <a:blip r:embed="rId3">
+            <a:extLst>
+              <a:ext uri="{28A0092B-C50C-407E-A947-70E740481C1C}">
+                <a14:useLocalDpi xmlns:a14="http://schemas.microsoft.com/office/drawing/2010/main" val="0"/>
+              </a:ext>
+            </a:extLst>
+          </a:blip>
+          <a:srcRect/>
+          <a:stretch>
+            <a:fillRect/>
+          </a:stretch>
+        </p:blipFill>
+        <p:spPr bwMode="auto">
+          <a:xfrm>
+            <a:off x="5507180" y="-1938620"/>
+            <a:ext cx="1164037" cy="1160158"/>
+          </a:xfrm>
+          <a:prstGeom prst="rect">
+            <a:avLst/>
+          </a:prstGeom>
+          <a:noFill/>
+          <a:extLst>
+            <a:ext uri="{909E8E84-426E-40DD-AFC4-6F175D3DCCD1}">
+              <a14:hiddenFill xmlns:a14="http://schemas.microsoft.com/office/drawing/2010/main">
+                <a:solidFill>
+                  <a:srgbClr val="FFFFFF"/>
+                </a:solidFill>
+              </a14:hiddenFill>
+            </a:ext>
+          </a:extLst>
+        </p:spPr>
+      </p:pic>
+      <p:sp>
+        <p:nvSpPr>
+          <p:cNvPr id="2" name="TextBox 1">
+            <a:extLst>
+              <a:ext uri="{FF2B5EF4-FFF2-40B4-BE49-F238E27FC236}">
+                <a16:creationId xmlns:a16="http://schemas.microsoft.com/office/drawing/2014/main" id="{D171AF14-B957-940D-9B9E-11004CF5EB94}"/>
+              </a:ext>
+            </a:extLst>
+          </p:cNvPr>
+          <p:cNvSpPr txBox="1"/>
+          <p:nvPr/>
+        </p:nvSpPr>
+        <p:spPr>
+          <a:xfrm>
+            <a:off x="4978782" y="-683683"/>
+            <a:ext cx="2234431" cy="646331"/>
+          </a:xfrm>
+          <a:prstGeom prst="rect">
+            <a:avLst/>
+          </a:prstGeom>
+          <a:noFill/>
+        </p:spPr>
+        <p:txBody>
+          <a:bodyPr wrap="square" rtlCol="0">
+            <a:spAutoFit/>
+          </a:bodyPr>
+          <a:lstStyle/>
+          <a:p>
+            <a:r>
+              <a:rPr lang="en-US" sz="3600" dirty="0">
+                <a:solidFill>
+                  <a:schemeClr val="bg1"/>
+                </a:solidFill>
+              </a:rPr>
+              <a:t>LG9158 TV</a:t>
+            </a:r>
+            <a:endParaRPr lang="sv-SE" sz="3600" dirty="0">
+              <a:solidFill>
+                <a:schemeClr val="bg1"/>
+              </a:solidFill>
+            </a:endParaRPr>
+          </a:p>
+        </p:txBody>
+      </p:sp>
+      <p:sp>
+        <p:nvSpPr>
+          <p:cNvPr id="8" name="TextBox 7">
+            <a:extLst>
+              <a:ext uri="{FF2B5EF4-FFF2-40B4-BE49-F238E27FC236}">
+                <a16:creationId xmlns:a16="http://schemas.microsoft.com/office/drawing/2014/main" id="{F3E7B99D-FF1E-4B58-2F55-2CA69C5695D0}"/>
+              </a:ext>
+            </a:extLst>
+          </p:cNvPr>
+          <p:cNvSpPr txBox="1"/>
+          <p:nvPr/>
+        </p:nvSpPr>
+        <p:spPr>
+          <a:xfrm>
+            <a:off x="4399138" y="6995036"/>
+            <a:ext cx="3393722" cy="923330"/>
+          </a:xfrm>
+          <a:prstGeom prst="rect">
+            <a:avLst/>
+          </a:prstGeom>
+          <a:noFill/>
+        </p:spPr>
+        <p:txBody>
+          <a:bodyPr wrap="square" rtlCol="0">
+            <a:spAutoFit/>
+          </a:bodyPr>
+          <a:lstStyle/>
+          <a:p>
+            <a:pPr algn="ctr"/>
+            <a:r>
+              <a:rPr lang="sv-SE" dirty="0">
+                <a:solidFill>
+                  <a:schemeClr val="bg1"/>
+                </a:solidFill>
+              </a:rPr>
+              <a:t>Must Monitor be the only enabled screen in order to trigger reaction?:</a:t>
+            </a:r>
+          </a:p>
+        </p:txBody>
+      </p:sp>
+      <p:sp>
+        <p:nvSpPr>
+          <p:cNvPr id="20" name="Oval 19">
+            <a:extLst>
+              <a:ext uri="{FF2B5EF4-FFF2-40B4-BE49-F238E27FC236}">
+                <a16:creationId xmlns:a16="http://schemas.microsoft.com/office/drawing/2014/main" id="{569FDC5F-5980-A875-6E89-0F3CFF8AF2B7}"/>
+              </a:ext>
+            </a:extLst>
+          </p:cNvPr>
+          <p:cNvSpPr/>
+          <p:nvPr/>
+        </p:nvSpPr>
+        <p:spPr>
+          <a:xfrm>
+            <a:off x="5051137" y="7918366"/>
+            <a:ext cx="835890" cy="835890"/>
+          </a:xfrm>
+          <a:prstGeom prst="ellipse">
+            <a:avLst/>
+          </a:prstGeom>
+          <a:solidFill>
+            <a:schemeClr val="tx1"/>
+          </a:solidFill>
+          <a:ln>
+            <a:solidFill>
+              <a:srgbClr val="70AD47"/>
+            </a:solidFill>
+          </a:ln>
+        </p:spPr>
+        <p:style>
+          <a:lnRef idx="2">
+            <a:schemeClr val="accent1">
+              <a:shade val="50000"/>
+            </a:schemeClr>
+          </a:lnRef>
+          <a:fillRef idx="1">
+            <a:schemeClr val="accent1"/>
+          </a:fillRef>
+          <a:effectRef idx="0">
+            <a:schemeClr val="accent1"/>
+          </a:effectRef>
+          <a:fontRef idx="minor">
+            <a:schemeClr val="lt1"/>
+          </a:fontRef>
+        </p:style>
+        <p:txBody>
+          <a:bodyPr rtlCol="0" anchor="ctr"/>
+          <a:lstStyle/>
+          <a:p>
+            <a:pPr algn="ctr"/>
+            <a:endParaRPr lang="sv-SE"/>
+          </a:p>
+        </p:txBody>
+      </p:sp>
+      <p:sp>
+        <p:nvSpPr>
+          <p:cNvPr id="12" name="TextBox 11">
+            <a:extLst>
+              <a:ext uri="{FF2B5EF4-FFF2-40B4-BE49-F238E27FC236}">
+                <a16:creationId xmlns:a16="http://schemas.microsoft.com/office/drawing/2014/main" id="{03CAC4CB-9F78-08FC-8A9C-31C4F84D9C32}"/>
+              </a:ext>
+            </a:extLst>
+          </p:cNvPr>
+          <p:cNvSpPr txBox="1"/>
+          <p:nvPr/>
+        </p:nvSpPr>
+        <p:spPr>
+          <a:xfrm>
+            <a:off x="5088529" y="8097784"/>
+            <a:ext cx="761106" cy="477054"/>
+          </a:xfrm>
+          <a:prstGeom prst="rect">
+            <a:avLst/>
+          </a:prstGeom>
+          <a:noFill/>
+        </p:spPr>
+        <p:txBody>
+          <a:bodyPr wrap="none" rtlCol="0">
+            <a:spAutoFit/>
+          </a:bodyPr>
+          <a:lstStyle/>
+          <a:p>
+            <a:r>
+              <a:rPr lang="sv-SE" sz="2500" dirty="0">
+                <a:solidFill>
+                  <a:schemeClr val="accent6"/>
+                </a:solidFill>
+              </a:rPr>
+              <a:t>True</a:t>
+            </a:r>
+          </a:p>
+        </p:txBody>
+      </p:sp>
+      <p:sp>
+        <p:nvSpPr>
+          <p:cNvPr id="21" name="Oval 20">
+            <a:extLst>
+              <a:ext uri="{FF2B5EF4-FFF2-40B4-BE49-F238E27FC236}">
+                <a16:creationId xmlns:a16="http://schemas.microsoft.com/office/drawing/2014/main" id="{561CE001-5D64-5388-1D1D-4791B1097205}"/>
+              </a:ext>
+            </a:extLst>
+          </p:cNvPr>
+          <p:cNvSpPr/>
+          <p:nvPr/>
+        </p:nvSpPr>
+        <p:spPr>
+          <a:xfrm>
+            <a:off x="6413208" y="7918366"/>
+            <a:ext cx="835890" cy="835890"/>
+          </a:xfrm>
+          <a:prstGeom prst="ellipse">
+            <a:avLst/>
+          </a:prstGeom>
+          <a:solidFill>
+            <a:schemeClr val="tx1"/>
+          </a:solidFill>
+          <a:ln>
+            <a:solidFill>
+              <a:srgbClr val="FF0000"/>
+            </a:solidFill>
+          </a:ln>
+        </p:spPr>
+        <p:style>
+          <a:lnRef idx="2">
+            <a:schemeClr val="accent1">
+              <a:shade val="50000"/>
+            </a:schemeClr>
+          </a:lnRef>
+          <a:fillRef idx="1">
+            <a:schemeClr val="accent1"/>
+          </a:fillRef>
+          <a:effectRef idx="0">
+            <a:schemeClr val="accent1"/>
+          </a:effectRef>
+          <a:fontRef idx="minor">
+            <a:schemeClr val="lt1"/>
+          </a:fontRef>
+        </p:style>
+        <p:txBody>
+          <a:bodyPr rtlCol="0" anchor="ctr"/>
+          <a:lstStyle/>
+          <a:p>
+            <a:pPr algn="ctr"/>
+            <a:endParaRPr lang="sv-SE"/>
+          </a:p>
+        </p:txBody>
+      </p:sp>
+      <p:sp>
+        <p:nvSpPr>
+          <p:cNvPr id="14" name="TextBox 13">
+            <a:extLst>
+              <a:ext uri="{FF2B5EF4-FFF2-40B4-BE49-F238E27FC236}">
+                <a16:creationId xmlns:a16="http://schemas.microsoft.com/office/drawing/2014/main" id="{6C2A2586-0913-4A68-2744-B56D4B25AAAD}"/>
+              </a:ext>
+            </a:extLst>
+          </p:cNvPr>
+          <p:cNvSpPr txBox="1"/>
+          <p:nvPr/>
+        </p:nvSpPr>
+        <p:spPr>
+          <a:xfrm>
+            <a:off x="6430168" y="8097784"/>
+            <a:ext cx="836511" cy="477054"/>
+          </a:xfrm>
+          <a:prstGeom prst="rect">
+            <a:avLst/>
+          </a:prstGeom>
+          <a:noFill/>
+        </p:spPr>
+        <p:txBody>
+          <a:bodyPr wrap="none" rtlCol="0">
+            <a:spAutoFit/>
+          </a:bodyPr>
+          <a:lstStyle/>
+          <a:p>
+            <a:r>
+              <a:rPr lang="sv-SE" sz="2500" dirty="0">
+                <a:solidFill>
+                  <a:srgbClr val="FF0000"/>
+                </a:solidFill>
+              </a:rPr>
+              <a:t>False</a:t>
+            </a:r>
+          </a:p>
+        </p:txBody>
+      </p:sp>
+      <p:sp>
+        <p:nvSpPr>
+          <p:cNvPr id="6" name="TextBox 5">
+            <a:extLst>
+              <a:ext uri="{FF2B5EF4-FFF2-40B4-BE49-F238E27FC236}">
+                <a16:creationId xmlns:a16="http://schemas.microsoft.com/office/drawing/2014/main" id="{8D6CB5B4-ADA7-A6F3-F324-23DAF0860955}"/>
+              </a:ext>
+            </a:extLst>
+          </p:cNvPr>
+          <p:cNvSpPr txBox="1"/>
+          <p:nvPr/>
+        </p:nvSpPr>
+        <p:spPr>
+          <a:xfrm>
+            <a:off x="1965088" y="3973899"/>
+            <a:ext cx="8261813" cy="461665"/>
+          </a:xfrm>
+          <a:prstGeom prst="rect">
+            <a:avLst/>
+          </a:prstGeom>
+          <a:noFill/>
+        </p:spPr>
+        <p:txBody>
+          <a:bodyPr wrap="none" rtlCol="0">
+            <a:spAutoFit/>
+          </a:bodyPr>
+          <a:lstStyle/>
+          <a:p>
+            <a:r>
+              <a:rPr lang="sv-SE" sz="2400" dirty="0">
+                <a:solidFill>
+                  <a:schemeClr val="bg1"/>
+                </a:solidFill>
+              </a:rPr>
+              <a:t>https://github.com/WootKennziz/screenon-makes-programs-run</a:t>
+            </a:r>
+          </a:p>
+        </p:txBody>
+      </p:sp>
+      <p:sp>
+        <p:nvSpPr>
+          <p:cNvPr id="7" name="TextBox 6">
+            <a:extLst>
+              <a:ext uri="{FF2B5EF4-FFF2-40B4-BE49-F238E27FC236}">
+                <a16:creationId xmlns:a16="http://schemas.microsoft.com/office/drawing/2014/main" id="{FE7997A6-C59D-9491-AB3E-E813166DF433}"/>
+              </a:ext>
+            </a:extLst>
+          </p:cNvPr>
+          <p:cNvSpPr txBox="1"/>
+          <p:nvPr/>
+        </p:nvSpPr>
+        <p:spPr>
+          <a:xfrm>
+            <a:off x="4967353" y="3561709"/>
+            <a:ext cx="2257285" cy="369332"/>
+          </a:xfrm>
+          <a:prstGeom prst="rect">
+            <a:avLst/>
+          </a:prstGeom>
+          <a:noFill/>
+        </p:spPr>
+        <p:txBody>
+          <a:bodyPr wrap="none" rtlCol="0">
+            <a:spAutoFit/>
+          </a:bodyPr>
+          <a:lstStyle/>
+          <a:p>
+            <a:r>
+              <a:rPr lang="en-US" dirty="0">
+                <a:solidFill>
+                  <a:schemeClr val="bg1"/>
+                </a:solidFill>
+              </a:rPr>
+              <a:t>Download and test at:</a:t>
+            </a:r>
+            <a:endParaRPr lang="sv-SE" dirty="0">
+              <a:solidFill>
+                <a:schemeClr val="bg1"/>
+              </a:solidFill>
+            </a:endParaRPr>
+          </a:p>
+        </p:txBody>
+      </p:sp>
+    </p:spTree>
+    <p:extLst>
+      <p:ext uri="{BB962C8B-B14F-4D97-AF65-F5344CB8AC3E}">
+        <p14:creationId xmlns:p14="http://schemas.microsoft.com/office/powerpoint/2010/main" val="437859663"/>
+      </p:ext>
+    </p:extLst>
+  </p:cSld>
+  <p:clrMapOvr>
+    <a:masterClrMapping/>
+  </p:clrMapOvr>
+  <mc:AlternateContent xmlns:mc="http://schemas.openxmlformats.org/markup-compatibility/2006">
+    <mc:Choice xmlns:p159="http://schemas.microsoft.com/office/powerpoint/2015/09/main" Requires="p159">
+      <p:transition xmlns:p14="http://schemas.microsoft.com/office/powerpoint/2010/main" spd="slow" p14:dur="2000">
+        <p159:morph option="byObject"/>
+      </p:transition>
+    </mc:Choice>
+    <mc:Fallback>
+      <p:transition spd="slow">
+        <p:fade/>
+      </p:transition>
+    </mc:Fallback>
+  </mc:AlternateContent>
 </p:sld>
 </file>
 

</xml_diff>

<commit_message>
updated gitignore and added presentation link
</commit_message>
<xml_diff>
--- a/presentation.pptx
+++ b/presentation.pptx
@@ -264,7 +264,7 @@
           <a:p>
             <a:fld id="{C032684F-3C3F-4551-A4FE-AAB17348CBF0}" type="datetimeFigureOut">
               <a:rPr lang="sv-SE" smtClean="0"/>
-              <a:t>2023-09-22</a:t>
+              <a:t>2023-10-11</a:t>
             </a:fld>
             <a:endParaRPr lang="sv-SE"/>
           </a:p>
@@ -464,7 +464,7 @@
           <a:p>
             <a:fld id="{C032684F-3C3F-4551-A4FE-AAB17348CBF0}" type="datetimeFigureOut">
               <a:rPr lang="sv-SE" smtClean="0"/>
-              <a:t>2023-09-22</a:t>
+              <a:t>2023-10-11</a:t>
             </a:fld>
             <a:endParaRPr lang="sv-SE"/>
           </a:p>
@@ -674,7 +674,7 @@
           <a:p>
             <a:fld id="{C032684F-3C3F-4551-A4FE-AAB17348CBF0}" type="datetimeFigureOut">
               <a:rPr lang="sv-SE" smtClean="0"/>
-              <a:t>2023-09-22</a:t>
+              <a:t>2023-10-11</a:t>
             </a:fld>
             <a:endParaRPr lang="sv-SE"/>
           </a:p>
@@ -874,7 +874,7 @@
           <a:p>
             <a:fld id="{C032684F-3C3F-4551-A4FE-AAB17348CBF0}" type="datetimeFigureOut">
               <a:rPr lang="sv-SE" smtClean="0"/>
-              <a:t>2023-09-22</a:t>
+              <a:t>2023-10-11</a:t>
             </a:fld>
             <a:endParaRPr lang="sv-SE"/>
           </a:p>
@@ -1150,7 +1150,7 @@
           <a:p>
             <a:fld id="{C032684F-3C3F-4551-A4FE-AAB17348CBF0}" type="datetimeFigureOut">
               <a:rPr lang="sv-SE" smtClean="0"/>
-              <a:t>2023-09-22</a:t>
+              <a:t>2023-10-11</a:t>
             </a:fld>
             <a:endParaRPr lang="sv-SE"/>
           </a:p>
@@ -1418,7 +1418,7 @@
           <a:p>
             <a:fld id="{C032684F-3C3F-4551-A4FE-AAB17348CBF0}" type="datetimeFigureOut">
               <a:rPr lang="sv-SE" smtClean="0"/>
-              <a:t>2023-09-22</a:t>
+              <a:t>2023-10-11</a:t>
             </a:fld>
             <a:endParaRPr lang="sv-SE"/>
           </a:p>
@@ -1833,7 +1833,7 @@
           <a:p>
             <a:fld id="{C032684F-3C3F-4551-A4FE-AAB17348CBF0}" type="datetimeFigureOut">
               <a:rPr lang="sv-SE" smtClean="0"/>
-              <a:t>2023-09-22</a:t>
+              <a:t>2023-10-11</a:t>
             </a:fld>
             <a:endParaRPr lang="sv-SE"/>
           </a:p>
@@ -1975,7 +1975,7 @@
           <a:p>
             <a:fld id="{C032684F-3C3F-4551-A4FE-AAB17348CBF0}" type="datetimeFigureOut">
               <a:rPr lang="sv-SE" smtClean="0"/>
-              <a:t>2023-09-22</a:t>
+              <a:t>2023-10-11</a:t>
             </a:fld>
             <a:endParaRPr lang="sv-SE"/>
           </a:p>
@@ -2088,7 +2088,7 @@
           <a:p>
             <a:fld id="{C032684F-3C3F-4551-A4FE-AAB17348CBF0}" type="datetimeFigureOut">
               <a:rPr lang="sv-SE" smtClean="0"/>
-              <a:t>2023-09-22</a:t>
+              <a:t>2023-10-11</a:t>
             </a:fld>
             <a:endParaRPr lang="sv-SE"/>
           </a:p>
@@ -2401,7 +2401,7 @@
           <a:p>
             <a:fld id="{C032684F-3C3F-4551-A4FE-AAB17348CBF0}" type="datetimeFigureOut">
               <a:rPr lang="sv-SE" smtClean="0"/>
-              <a:t>2023-09-22</a:t>
+              <a:t>2023-10-11</a:t>
             </a:fld>
             <a:endParaRPr lang="sv-SE"/>
           </a:p>
@@ -2690,7 +2690,7 @@
           <a:p>
             <a:fld id="{C032684F-3C3F-4551-A4FE-AAB17348CBF0}" type="datetimeFigureOut">
               <a:rPr lang="sv-SE" smtClean="0"/>
-              <a:t>2023-09-22</a:t>
+              <a:t>2023-10-11</a:t>
             </a:fld>
             <a:endParaRPr lang="sv-SE"/>
           </a:p>
@@ -2933,7 +2933,7 @@
           <a:p>
             <a:fld id="{C032684F-3C3F-4551-A4FE-AAB17348CBF0}" type="datetimeFigureOut">
               <a:rPr lang="sv-SE" smtClean="0"/>
-              <a:t>2023-09-22</a:t>
+              <a:t>2023-10-11</a:t>
             </a:fld>
             <a:endParaRPr lang="sv-SE"/>
           </a:p>
@@ -3443,7 +3443,7 @@
             <a:pPr algn="ctr"/>
             <a:r>
               <a:rPr lang="sv-SE" dirty="0"/>
-              <a:t>Screen</a:t>
+              <a:t>Display</a:t>
             </a:r>
           </a:p>
         </p:txBody>
@@ -3555,7 +3555,7 @@
             <a:pPr algn="ctr"/>
             <a:r>
               <a:rPr lang="sv-SE" dirty="0"/>
-              <a:t>Screen</a:t>
+              <a:t>Display</a:t>
             </a:r>
           </a:p>
         </p:txBody>
@@ -5947,13 +5947,13 @@
   <p:clrMapOvr>
     <a:masterClrMapping/>
   </p:clrMapOvr>
-  <mc:AlternateContent xmlns:mc="http://schemas.openxmlformats.org/markup-compatibility/2006">
-    <mc:Choice xmlns:p159="http://schemas.microsoft.com/office/powerpoint/2015/09/main" Requires="p159">
+  <mc:AlternateContent xmlns:mc="http://schemas.openxmlformats.org/markup-compatibility/2006" xmlns:p159="http://schemas.microsoft.com/office/powerpoint/2015/09/main">
+    <mc:Choice Requires="p159">
       <p:transition xmlns:p14="http://schemas.microsoft.com/office/powerpoint/2010/main" spd="slow" p14:dur="2000">
         <p159:morph option="byObject"/>
       </p:transition>
     </mc:Choice>
-    <mc:Fallback>
+    <mc:Fallback xmlns="">
       <p:transition spd="slow">
         <p:fade/>
       </p:transition>
@@ -7672,13 +7672,13 @@
   <p:clrMapOvr>
     <a:masterClrMapping/>
   </p:clrMapOvr>
-  <mc:AlternateContent xmlns:mc="http://schemas.openxmlformats.org/markup-compatibility/2006">
-    <mc:Choice xmlns:p159="http://schemas.microsoft.com/office/powerpoint/2015/09/main" Requires="p159">
+  <mc:AlternateContent xmlns:mc="http://schemas.openxmlformats.org/markup-compatibility/2006" xmlns:p159="http://schemas.microsoft.com/office/powerpoint/2015/09/main">
+    <mc:Choice Requires="p159">
       <p:transition xmlns:p14="http://schemas.microsoft.com/office/powerpoint/2010/main" spd="slow" p14:dur="2000">
         <p159:morph option="byObject"/>
       </p:transition>
     </mc:Choice>
-    <mc:Fallback>
+    <mc:Fallback xmlns="">
       <p:transition spd="slow">
         <p:fade/>
       </p:transition>
@@ -8338,13 +8338,13 @@
   <p:clrMapOvr>
     <a:masterClrMapping/>
   </p:clrMapOvr>
-  <mc:AlternateContent xmlns:mc="http://schemas.openxmlformats.org/markup-compatibility/2006">
-    <mc:Choice xmlns:p159="http://schemas.microsoft.com/office/powerpoint/2015/09/main" Requires="p159">
+  <mc:AlternateContent xmlns:mc="http://schemas.openxmlformats.org/markup-compatibility/2006" xmlns:p159="http://schemas.microsoft.com/office/powerpoint/2015/09/main">
+    <mc:Choice Requires="p159">
       <p:transition xmlns:p14="http://schemas.microsoft.com/office/powerpoint/2010/main" spd="slow" p14:dur="2000">
         <p159:morph option="byObject"/>
       </p:transition>
     </mc:Choice>
-    <mc:Fallback>
+    <mc:Fallback xmlns="">
       <p:transition spd="slow">
         <p:fade/>
       </p:transition>

</xml_diff>